<commit_message>
Final Milestone 1 PPT
</commit_message>
<xml_diff>
--- a/Documents/Presentations/Milestone 1 presentation.pptx
+++ b/Documents/Presentations/Milestone 1 presentation.pptx
@@ -8,12 +8,15 @@
     <p:sldId id="256" r:id="rId2"/>
     <p:sldId id="257" r:id="rId3"/>
     <p:sldId id="266" r:id="rId4"/>
-    <p:sldId id="258" r:id="rId5"/>
-    <p:sldId id="259" r:id="rId6"/>
-    <p:sldId id="260" r:id="rId7"/>
-    <p:sldId id="262" r:id="rId8"/>
-    <p:sldId id="264" r:id="rId9"/>
-    <p:sldId id="265" r:id="rId10"/>
+    <p:sldId id="267" r:id="rId5"/>
+    <p:sldId id="268" r:id="rId6"/>
+    <p:sldId id="269" r:id="rId7"/>
+    <p:sldId id="270" r:id="rId8"/>
+    <p:sldId id="271" r:id="rId9"/>
+    <p:sldId id="260" r:id="rId10"/>
+    <p:sldId id="262" r:id="rId11"/>
+    <p:sldId id="264" r:id="rId12"/>
+    <p:sldId id="265" r:id="rId13"/>
   </p:sldIdLst>
   <p:sldSz cx="12192000" cy="6858000"/>
   <p:notesSz cx="6858000" cy="9144000"/>
@@ -3249,6 +3252,730 @@
 </p:sld>
 </file>
 
+<file path=ppt/slides/slide10.xml><?xml version="1.0" encoding="utf-8"?>
+<p:sld xmlns:a="http://schemas.openxmlformats.org/drawingml/2006/main" xmlns:r="http://schemas.openxmlformats.org/officeDocument/2006/relationships" xmlns:p="http://schemas.openxmlformats.org/presentationml/2006/main">
+  <p:cSld>
+    <p:spTree>
+      <p:nvGrpSpPr>
+        <p:cNvPr id="1" name=""/>
+        <p:cNvGrpSpPr/>
+        <p:nvPr/>
+      </p:nvGrpSpPr>
+      <p:grpSpPr>
+        <a:xfrm>
+          <a:off x="0" y="0"/>
+          <a:ext cx="0" cy="0"/>
+          <a:chOff x="0" y="0"/>
+          <a:chExt cx="0" cy="0"/>
+        </a:xfrm>
+      </p:grpSpPr>
+      <p:sp>
+        <p:nvSpPr>
+          <p:cNvPr id="2" name="Title 1"/>
+          <p:cNvSpPr>
+            <a:spLocks noGrp="1"/>
+          </p:cNvSpPr>
+          <p:nvPr>
+            <p:ph type="title"/>
+          </p:nvPr>
+        </p:nvSpPr>
+        <p:spPr/>
+        <p:txBody>
+          <a:bodyPr/>
+          <a:lstStyle/>
+          <a:p>
+            <a:r>
+              <a:rPr lang="en-US" dirty="0" smtClean="0"/>
+              <a:t>Milestone 2</a:t>
+            </a:r>
+            <a:endParaRPr lang="en-US" dirty="0"/>
+          </a:p>
+        </p:txBody>
+      </p:sp>
+      <p:sp>
+        <p:nvSpPr>
+          <p:cNvPr id="3" name="Content Placeholder 2"/>
+          <p:cNvSpPr>
+            <a:spLocks noGrp="1"/>
+          </p:cNvSpPr>
+          <p:nvPr>
+            <p:ph idx="1"/>
+          </p:nvPr>
+        </p:nvSpPr>
+        <p:spPr/>
+        <p:txBody>
+          <a:bodyPr/>
+          <a:lstStyle/>
+          <a:p>
+            <a:r>
+              <a:rPr lang="en-US" dirty="0" smtClean="0"/>
+              <a:t>Parsing the database - </a:t>
+            </a:r>
+            <a:r>
+              <a:rPr lang="en-US" dirty="0"/>
+              <a:t>Take our skeleton infrastructure of a database and add to it the functionality of information retrieval. Set it up so that the user can enter query commands and actually retrieve information stored in the database.</a:t>
+            </a:r>
+          </a:p>
+          <a:p>
+            <a:r>
+              <a:rPr lang="en-US" dirty="0" smtClean="0"/>
+              <a:t>Do a GUI mockup and present to GE - </a:t>
+            </a:r>
+            <a:r>
+              <a:rPr lang="en-US" dirty="0"/>
+              <a:t>Take our design documents of our GUI that we created in Photoshop and implement it into C# code. After completing the implementation, we will present it to Dan Ballesty for review and critique.</a:t>
+            </a:r>
+          </a:p>
+          <a:p>
+            <a:pPr marL="137160" lvl="0" indent="0">
+              <a:buNone/>
+            </a:pPr>
+            <a:endParaRPr lang="en-US" dirty="0" smtClean="0"/>
+          </a:p>
+          <a:p>
+            <a:endParaRPr lang="en-US" dirty="0"/>
+          </a:p>
+        </p:txBody>
+      </p:sp>
+    </p:spTree>
+  </p:cSld>
+  <p:clrMapOvr>
+    <a:masterClrMapping/>
+  </p:clrMapOvr>
+</p:sld>
+</file>
+
+<file path=ppt/slides/slide11.xml><?xml version="1.0" encoding="utf-8"?>
+<p:sld xmlns:a="http://schemas.openxmlformats.org/drawingml/2006/main" xmlns:r="http://schemas.openxmlformats.org/officeDocument/2006/relationships" xmlns:p="http://schemas.openxmlformats.org/presentationml/2006/main">
+  <p:cSld>
+    <p:spTree>
+      <p:nvGrpSpPr>
+        <p:cNvPr id="1" name=""/>
+        <p:cNvGrpSpPr/>
+        <p:nvPr/>
+      </p:nvGrpSpPr>
+      <p:grpSpPr>
+        <a:xfrm>
+          <a:off x="0" y="0"/>
+          <a:ext cx="0" cy="0"/>
+          <a:chOff x="0" y="0"/>
+          <a:chExt cx="0" cy="0"/>
+        </a:xfrm>
+      </p:grpSpPr>
+      <p:sp>
+        <p:nvSpPr>
+          <p:cNvPr id="2" name="Title 1"/>
+          <p:cNvSpPr>
+            <a:spLocks noGrp="1"/>
+          </p:cNvSpPr>
+          <p:nvPr>
+            <p:ph type="title"/>
+          </p:nvPr>
+        </p:nvSpPr>
+        <p:spPr>
+          <a:xfrm>
+            <a:off x="1619794" y="0"/>
+            <a:ext cx="8878388" cy="731520"/>
+          </a:xfrm>
+        </p:spPr>
+        <p:txBody>
+          <a:bodyPr>
+            <a:normAutofit/>
+          </a:bodyPr>
+          <a:lstStyle/>
+          <a:p>
+            <a:r>
+              <a:rPr lang="en-US" sz="3600" dirty="0" smtClean="0"/>
+              <a:t>Milestone 2 Role Distribution</a:t>
+            </a:r>
+            <a:endParaRPr lang="en-US" sz="3600" dirty="0"/>
+          </a:p>
+        </p:txBody>
+      </p:sp>
+      <p:graphicFrame>
+        <p:nvGraphicFramePr>
+          <p:cNvPr id="4" name="Content Placeholder 3"/>
+          <p:cNvGraphicFramePr>
+            <a:graphicFrameLocks noGrp="1"/>
+          </p:cNvGraphicFramePr>
+          <p:nvPr>
+            <p:ph idx="1"/>
+            <p:extLst>
+              <p:ext uri="{D42A27DB-BD31-4B8C-83A1-F6EECF244321}">
+                <p14:modId xmlns:p14="http://schemas.microsoft.com/office/powerpoint/2010/main" xmlns="" val="761006259"/>
+              </p:ext>
+            </p:extLst>
+          </p:nvPr>
+        </p:nvGraphicFramePr>
+        <p:xfrm>
+          <a:off x="361406" y="1892953"/>
+          <a:ext cx="11373395" cy="3307515"/>
+        </p:xfrm>
+        <a:graphic>
+          <a:graphicData uri="http://schemas.openxmlformats.org/drawingml/2006/table">
+            <a:tbl>
+              <a:tblPr firstRow="1" bandRow="1">
+                <a:tableStyleId>{5C22544A-7EE6-4342-B048-85BDC9FD1C3A}</a:tableStyleId>
+              </a:tblPr>
+              <a:tblGrid>
+                <a:gridCol w="2274679"/>
+                <a:gridCol w="2274679"/>
+                <a:gridCol w="2274679"/>
+                <a:gridCol w="2274679"/>
+                <a:gridCol w="2274679"/>
+              </a:tblGrid>
+              <a:tr h="1102505">
+                <a:tc>
+                  <a:txBody>
+                    <a:bodyPr/>
+                    <a:lstStyle/>
+                    <a:p>
+                      <a:r>
+                        <a:rPr lang="en-US" sz="2400" dirty="0" smtClean="0"/>
+                        <a:t>Task</a:t>
+                      </a:r>
+                      <a:endParaRPr lang="en-US" sz="2400" dirty="0"/>
+                    </a:p>
+                  </a:txBody>
+                  <a:tcPr/>
+                </a:tc>
+                <a:tc>
+                  <a:txBody>
+                    <a:bodyPr/>
+                    <a:lstStyle/>
+                    <a:p>
+                      <a:r>
+                        <a:rPr lang="en-US" sz="2400" dirty="0" smtClean="0"/>
+                        <a:t>Chad</a:t>
+                      </a:r>
+                      <a:endParaRPr lang="en-US" sz="2400" dirty="0"/>
+                    </a:p>
+                  </a:txBody>
+                  <a:tcPr/>
+                </a:tc>
+                <a:tc>
+                  <a:txBody>
+                    <a:bodyPr/>
+                    <a:lstStyle/>
+                    <a:p>
+                      <a:r>
+                        <a:rPr lang="en-US" sz="2400" dirty="0" smtClean="0"/>
+                        <a:t>Ken</a:t>
+                      </a:r>
+                      <a:endParaRPr lang="en-US" sz="2400" dirty="0"/>
+                    </a:p>
+                  </a:txBody>
+                  <a:tcPr/>
+                </a:tc>
+                <a:tc>
+                  <a:txBody>
+                    <a:bodyPr/>
+                    <a:lstStyle/>
+                    <a:p>
+                      <a:r>
+                        <a:rPr lang="en-US" sz="2400" dirty="0" smtClean="0"/>
+                        <a:t>Chris</a:t>
+                      </a:r>
+                      <a:endParaRPr lang="en-US" sz="2400" dirty="0"/>
+                    </a:p>
+                  </a:txBody>
+                  <a:tcPr/>
+                </a:tc>
+                <a:tc>
+                  <a:txBody>
+                    <a:bodyPr/>
+                    <a:lstStyle/>
+                    <a:p>
+                      <a:r>
+                        <a:rPr lang="en-US" sz="2400" dirty="0" smtClean="0"/>
+                        <a:t>Zach</a:t>
+                      </a:r>
+                      <a:endParaRPr lang="en-US" sz="2400" dirty="0"/>
+                    </a:p>
+                  </a:txBody>
+                  <a:tcPr/>
+                </a:tc>
+              </a:tr>
+              <a:tr h="1102505">
+                <a:tc>
+                  <a:txBody>
+                    <a:bodyPr/>
+                    <a:lstStyle/>
+                    <a:p>
+                      <a:pPr marL="0" marR="0" indent="0" algn="l" defTabSz="914400" rtl="0" eaLnBrk="1" fontAlgn="auto" latinLnBrk="0" hangingPunct="1">
+                        <a:lnSpc>
+                          <a:spcPct val="100000"/>
+                        </a:lnSpc>
+                        <a:spcBef>
+                          <a:spcPts val="0"/>
+                        </a:spcBef>
+                        <a:spcAft>
+                          <a:spcPts val="0"/>
+                        </a:spcAft>
+                        <a:buClrTx/>
+                        <a:buSzTx/>
+                        <a:buFontTx/>
+                        <a:buNone/>
+                        <a:tabLst/>
+                        <a:defRPr/>
+                      </a:pPr>
+                      <a:r>
+                        <a:rPr kumimoji="0" lang="en-US" sz="1400" kern="1200" dirty="0" smtClean="0">
+                          <a:solidFill>
+                            <a:schemeClr val="dk1"/>
+                          </a:solidFill>
+                          <a:latin typeface="+mn-lt"/>
+                          <a:ea typeface="+mn-ea"/>
+                          <a:cs typeface="+mn-cs"/>
+                        </a:rPr>
+                        <a:t>Parsing the</a:t>
+                      </a:r>
+                      <a:r>
+                        <a:rPr kumimoji="0" lang="en-US" sz="1400" kern="1200" baseline="0" dirty="0" smtClean="0">
+                          <a:solidFill>
+                            <a:schemeClr val="dk1"/>
+                          </a:solidFill>
+                          <a:latin typeface="+mn-lt"/>
+                          <a:ea typeface="+mn-ea"/>
+                          <a:cs typeface="+mn-cs"/>
+                        </a:rPr>
+                        <a:t> Database information</a:t>
+                      </a:r>
+                      <a:endParaRPr kumimoji="0" lang="en-US" sz="1400" kern="1200" dirty="0" smtClean="0">
+                        <a:solidFill>
+                          <a:schemeClr val="dk1"/>
+                        </a:solidFill>
+                        <a:latin typeface="+mn-lt"/>
+                        <a:ea typeface="+mn-ea"/>
+                        <a:cs typeface="+mn-cs"/>
+                      </a:endParaRPr>
+                    </a:p>
+                    <a:p>
+                      <a:endParaRPr lang="en-US" dirty="0"/>
+                    </a:p>
+                  </a:txBody>
+                  <a:tcPr/>
+                </a:tc>
+                <a:tc>
+                  <a:txBody>
+                    <a:bodyPr/>
+                    <a:lstStyle/>
+                    <a:p>
+                      <a:pPr algn="ctr"/>
+                      <a:r>
+                        <a:rPr lang="en-US" dirty="0" smtClean="0"/>
+                        <a:t>0%</a:t>
+                      </a:r>
+                      <a:endParaRPr lang="en-US" dirty="0"/>
+                    </a:p>
+                  </a:txBody>
+                  <a:tcPr/>
+                </a:tc>
+                <a:tc>
+                  <a:txBody>
+                    <a:bodyPr/>
+                    <a:lstStyle/>
+                    <a:p>
+                      <a:pPr marL="0" marR="0" indent="0" algn="ctr" defTabSz="914400" rtl="0" eaLnBrk="1" fontAlgn="auto" latinLnBrk="0" hangingPunct="1">
+                        <a:lnSpc>
+                          <a:spcPct val="100000"/>
+                        </a:lnSpc>
+                        <a:spcBef>
+                          <a:spcPts val="0"/>
+                        </a:spcBef>
+                        <a:spcAft>
+                          <a:spcPts val="0"/>
+                        </a:spcAft>
+                        <a:buClrTx/>
+                        <a:buSzTx/>
+                        <a:buFontTx/>
+                        <a:buNone/>
+                        <a:tabLst/>
+                        <a:defRPr/>
+                      </a:pPr>
+                      <a:r>
+                        <a:rPr lang="en-US" dirty="0" smtClean="0"/>
+                        <a:t>100%</a:t>
+                      </a:r>
+                      <a:endParaRPr lang="en-US" dirty="0" smtClean="0"/>
+                    </a:p>
+                    <a:p>
+                      <a:pPr algn="ctr"/>
+                      <a:endParaRPr lang="en-US" dirty="0"/>
+                    </a:p>
+                  </a:txBody>
+                  <a:tcPr/>
+                </a:tc>
+                <a:tc>
+                  <a:txBody>
+                    <a:bodyPr/>
+                    <a:lstStyle/>
+                    <a:p>
+                      <a:pPr marL="0" marR="0" indent="0" algn="ctr" defTabSz="914400" rtl="0" eaLnBrk="1" fontAlgn="auto" latinLnBrk="0" hangingPunct="1">
+                        <a:lnSpc>
+                          <a:spcPct val="100000"/>
+                        </a:lnSpc>
+                        <a:spcBef>
+                          <a:spcPts val="0"/>
+                        </a:spcBef>
+                        <a:spcAft>
+                          <a:spcPts val="0"/>
+                        </a:spcAft>
+                        <a:buClrTx/>
+                        <a:buSzTx/>
+                        <a:buFontTx/>
+                        <a:buNone/>
+                        <a:tabLst/>
+                        <a:defRPr/>
+                      </a:pPr>
+                      <a:r>
+                        <a:rPr lang="en-US" dirty="0" smtClean="0"/>
+                        <a:t>100%</a:t>
+                      </a:r>
+                      <a:endParaRPr lang="en-US" dirty="0" smtClean="0"/>
+                    </a:p>
+                    <a:p>
+                      <a:pPr algn="ctr"/>
+                      <a:endParaRPr lang="en-US" dirty="0"/>
+                    </a:p>
+                  </a:txBody>
+                  <a:tcPr/>
+                </a:tc>
+                <a:tc>
+                  <a:txBody>
+                    <a:bodyPr/>
+                    <a:lstStyle/>
+                    <a:p>
+                      <a:pPr marL="0" marR="0" indent="0" algn="ctr" defTabSz="914400" rtl="0" eaLnBrk="1" fontAlgn="auto" latinLnBrk="0" hangingPunct="1">
+                        <a:lnSpc>
+                          <a:spcPct val="100000"/>
+                        </a:lnSpc>
+                        <a:spcBef>
+                          <a:spcPts val="0"/>
+                        </a:spcBef>
+                        <a:spcAft>
+                          <a:spcPts val="0"/>
+                        </a:spcAft>
+                        <a:buClrTx/>
+                        <a:buSzTx/>
+                        <a:buFontTx/>
+                        <a:buNone/>
+                        <a:tabLst/>
+                        <a:defRPr/>
+                      </a:pPr>
+                      <a:r>
+                        <a:rPr lang="en-US" dirty="0" smtClean="0"/>
+                        <a:t>0%</a:t>
+                      </a:r>
+                      <a:endParaRPr lang="en-US" dirty="0" smtClean="0"/>
+                    </a:p>
+                    <a:p>
+                      <a:pPr algn="ctr"/>
+                      <a:endParaRPr lang="en-US" dirty="0"/>
+                    </a:p>
+                  </a:txBody>
+                  <a:tcPr/>
+                </a:tc>
+              </a:tr>
+              <a:tr h="1102505">
+                <a:tc>
+                  <a:txBody>
+                    <a:bodyPr/>
+                    <a:lstStyle/>
+                    <a:p>
+                      <a:pPr marL="0" marR="0" indent="0" algn="l" defTabSz="914400" rtl="0" eaLnBrk="1" fontAlgn="auto" latinLnBrk="0" hangingPunct="1">
+                        <a:lnSpc>
+                          <a:spcPct val="100000"/>
+                        </a:lnSpc>
+                        <a:spcBef>
+                          <a:spcPts val="0"/>
+                        </a:spcBef>
+                        <a:spcAft>
+                          <a:spcPts val="0"/>
+                        </a:spcAft>
+                        <a:buClrTx/>
+                        <a:buSzTx/>
+                        <a:buFontTx/>
+                        <a:buNone/>
+                        <a:tabLst/>
+                        <a:defRPr/>
+                      </a:pPr>
+                      <a:r>
+                        <a:rPr kumimoji="0" lang="en-US" sz="1400" kern="1200" dirty="0" smtClean="0">
+                          <a:solidFill>
+                            <a:schemeClr val="dk1"/>
+                          </a:solidFill>
+                          <a:latin typeface="+mn-lt"/>
+                          <a:ea typeface="+mn-ea"/>
+                          <a:cs typeface="+mn-cs"/>
+                        </a:rPr>
+                        <a:t>Do a GUI Mockup and</a:t>
+                      </a:r>
+                      <a:r>
+                        <a:rPr kumimoji="0" lang="en-US" sz="1400" kern="1200" baseline="0" dirty="0" smtClean="0">
+                          <a:solidFill>
+                            <a:schemeClr val="dk1"/>
+                          </a:solidFill>
+                          <a:latin typeface="+mn-lt"/>
+                          <a:ea typeface="+mn-ea"/>
+                          <a:cs typeface="+mn-cs"/>
+                        </a:rPr>
+                        <a:t> present to GE</a:t>
+                      </a:r>
+                      <a:endParaRPr kumimoji="0" lang="en-US" sz="1400" kern="1200" dirty="0" smtClean="0">
+                        <a:solidFill>
+                          <a:schemeClr val="dk1"/>
+                        </a:solidFill>
+                        <a:latin typeface="+mn-lt"/>
+                        <a:ea typeface="+mn-ea"/>
+                        <a:cs typeface="+mn-cs"/>
+                      </a:endParaRPr>
+                    </a:p>
+                    <a:p>
+                      <a:endParaRPr lang="en-US" dirty="0"/>
+                    </a:p>
+                  </a:txBody>
+                  <a:tcPr/>
+                </a:tc>
+                <a:tc>
+                  <a:txBody>
+                    <a:bodyPr/>
+                    <a:lstStyle/>
+                    <a:p>
+                      <a:pPr marL="0" marR="0" indent="0" algn="ctr" defTabSz="914400" rtl="0" eaLnBrk="1" fontAlgn="auto" latinLnBrk="0" hangingPunct="1">
+                        <a:lnSpc>
+                          <a:spcPct val="100000"/>
+                        </a:lnSpc>
+                        <a:spcBef>
+                          <a:spcPts val="0"/>
+                        </a:spcBef>
+                        <a:spcAft>
+                          <a:spcPts val="0"/>
+                        </a:spcAft>
+                        <a:buClrTx/>
+                        <a:buSzTx/>
+                        <a:buFontTx/>
+                        <a:buNone/>
+                        <a:tabLst/>
+                        <a:defRPr/>
+                      </a:pPr>
+                      <a:r>
+                        <a:rPr lang="en-US" dirty="0" smtClean="0"/>
+                        <a:t>100%</a:t>
+                      </a:r>
+                      <a:endParaRPr lang="en-US" dirty="0" smtClean="0"/>
+                    </a:p>
+                    <a:p>
+                      <a:pPr algn="ctr"/>
+                      <a:endParaRPr lang="en-US" dirty="0"/>
+                    </a:p>
+                  </a:txBody>
+                  <a:tcPr/>
+                </a:tc>
+                <a:tc>
+                  <a:txBody>
+                    <a:bodyPr/>
+                    <a:lstStyle/>
+                    <a:p>
+                      <a:pPr marL="0" marR="0" indent="0" algn="ctr" defTabSz="914400" rtl="0" eaLnBrk="1" fontAlgn="auto" latinLnBrk="0" hangingPunct="1">
+                        <a:lnSpc>
+                          <a:spcPct val="100000"/>
+                        </a:lnSpc>
+                        <a:spcBef>
+                          <a:spcPts val="0"/>
+                        </a:spcBef>
+                        <a:spcAft>
+                          <a:spcPts val="0"/>
+                        </a:spcAft>
+                        <a:buClrTx/>
+                        <a:buSzTx/>
+                        <a:buFontTx/>
+                        <a:buNone/>
+                        <a:tabLst/>
+                        <a:defRPr/>
+                      </a:pPr>
+                      <a:r>
+                        <a:rPr lang="en-US" dirty="0" smtClean="0"/>
+                        <a:t>0%</a:t>
+                      </a:r>
+                      <a:endParaRPr lang="en-US" dirty="0" smtClean="0"/>
+                    </a:p>
+                    <a:p>
+                      <a:pPr algn="ctr"/>
+                      <a:endParaRPr lang="en-US" dirty="0"/>
+                    </a:p>
+                  </a:txBody>
+                  <a:tcPr/>
+                </a:tc>
+                <a:tc>
+                  <a:txBody>
+                    <a:bodyPr/>
+                    <a:lstStyle/>
+                    <a:p>
+                      <a:pPr marL="0" marR="0" indent="0" algn="ctr" defTabSz="914400" rtl="0" eaLnBrk="1" fontAlgn="auto" latinLnBrk="0" hangingPunct="1">
+                        <a:lnSpc>
+                          <a:spcPct val="100000"/>
+                        </a:lnSpc>
+                        <a:spcBef>
+                          <a:spcPts val="0"/>
+                        </a:spcBef>
+                        <a:spcAft>
+                          <a:spcPts val="0"/>
+                        </a:spcAft>
+                        <a:buClrTx/>
+                        <a:buSzTx/>
+                        <a:buFontTx/>
+                        <a:buNone/>
+                        <a:tabLst/>
+                        <a:defRPr/>
+                      </a:pPr>
+                      <a:r>
+                        <a:rPr lang="en-US" dirty="0" smtClean="0"/>
+                        <a:t>0%</a:t>
+                      </a:r>
+                      <a:endParaRPr lang="en-US" dirty="0" smtClean="0"/>
+                    </a:p>
+                    <a:p>
+                      <a:pPr algn="ctr"/>
+                      <a:endParaRPr lang="en-US" dirty="0"/>
+                    </a:p>
+                  </a:txBody>
+                  <a:tcPr/>
+                </a:tc>
+                <a:tc>
+                  <a:txBody>
+                    <a:bodyPr/>
+                    <a:lstStyle/>
+                    <a:p>
+                      <a:pPr marL="0" marR="0" indent="0" algn="ctr" defTabSz="914400" rtl="0" eaLnBrk="1" fontAlgn="auto" latinLnBrk="0" hangingPunct="1">
+                        <a:lnSpc>
+                          <a:spcPct val="100000"/>
+                        </a:lnSpc>
+                        <a:spcBef>
+                          <a:spcPts val="0"/>
+                        </a:spcBef>
+                        <a:spcAft>
+                          <a:spcPts val="0"/>
+                        </a:spcAft>
+                        <a:buClrTx/>
+                        <a:buSzTx/>
+                        <a:buFontTx/>
+                        <a:buNone/>
+                        <a:tabLst/>
+                        <a:defRPr/>
+                      </a:pPr>
+                      <a:r>
+                        <a:rPr lang="en-US" dirty="0" smtClean="0"/>
+                        <a:t>100%</a:t>
+                      </a:r>
+                      <a:endParaRPr lang="en-US" dirty="0" smtClean="0"/>
+                    </a:p>
+                    <a:p>
+                      <a:pPr algn="ctr"/>
+                      <a:endParaRPr lang="en-US" dirty="0"/>
+                    </a:p>
+                  </a:txBody>
+                  <a:tcPr/>
+                </a:tc>
+              </a:tr>
+            </a:tbl>
+          </a:graphicData>
+        </a:graphic>
+      </p:graphicFrame>
+    </p:spTree>
+  </p:cSld>
+  <p:clrMapOvr>
+    <a:masterClrMapping/>
+  </p:clrMapOvr>
+</p:sld>
+</file>
+
+<file path=ppt/slides/slide12.xml><?xml version="1.0" encoding="utf-8"?>
+<p:sld xmlns:a="http://schemas.openxmlformats.org/drawingml/2006/main" xmlns:r="http://schemas.openxmlformats.org/officeDocument/2006/relationships" xmlns:p="http://schemas.openxmlformats.org/presentationml/2006/main">
+  <p:cSld>
+    <p:spTree>
+      <p:nvGrpSpPr>
+        <p:cNvPr id="1" name=""/>
+        <p:cNvGrpSpPr/>
+        <p:nvPr/>
+      </p:nvGrpSpPr>
+      <p:grpSpPr>
+        <a:xfrm>
+          <a:off x="0" y="0"/>
+          <a:ext cx="0" cy="0"/>
+          <a:chOff x="0" y="0"/>
+          <a:chExt cx="0" cy="0"/>
+        </a:xfrm>
+      </p:grpSpPr>
+      <p:pic>
+        <p:nvPicPr>
+          <p:cNvPr id="6" name="Content Placeholder 5" descr="getrains3.jpg"/>
+          <p:cNvPicPr>
+            <a:picLocks noGrp="1" noChangeAspect="1"/>
+          </p:cNvPicPr>
+          <p:nvPr>
+            <p:ph idx="1"/>
+          </p:nvPr>
+        </p:nvPicPr>
+        <p:blipFill>
+          <a:blip r:embed="rId2" cstate="print"/>
+          <a:stretch>
+            <a:fillRect/>
+          </a:stretch>
+        </p:blipFill>
+        <p:spPr>
+          <a:xfrm>
+            <a:off x="22706" y="5871"/>
+            <a:ext cx="12169294" cy="6794471"/>
+          </a:xfrm>
+        </p:spPr>
+      </p:pic>
+      <p:sp>
+        <p:nvSpPr>
+          <p:cNvPr id="7" name="TextBox 6"/>
+          <p:cNvSpPr txBox="1"/>
+          <p:nvPr/>
+        </p:nvSpPr>
+        <p:spPr>
+          <a:xfrm>
+            <a:off x="169818" y="195943"/>
+            <a:ext cx="5081840" cy="923330"/>
+          </a:xfrm>
+          <a:prstGeom prst="rect">
+            <a:avLst/>
+          </a:prstGeom>
+          <a:noFill/>
+        </p:spPr>
+        <p:txBody>
+          <a:bodyPr wrap="none" rtlCol="0">
+            <a:spAutoFit/>
+          </a:bodyPr>
+          <a:lstStyle/>
+          <a:p>
+            <a:r>
+              <a:rPr lang="en-US" sz="5400" dirty="0" smtClean="0">
+                <a:solidFill>
+                  <a:schemeClr val="bg1"/>
+                </a:solidFill>
+              </a:rPr>
+              <a:t>Any Questions?</a:t>
+            </a:r>
+            <a:endParaRPr lang="en-US" sz="5400" dirty="0">
+              <a:solidFill>
+                <a:schemeClr val="bg1"/>
+              </a:solidFill>
+            </a:endParaRPr>
+          </a:p>
+        </p:txBody>
+      </p:sp>
+    </p:spTree>
+  </p:cSld>
+  <p:clrMapOvr>
+    <a:masterClrMapping/>
+  </p:clrMapOvr>
+</p:sld>
+</file>
+
 <file path=ppt/slides/slide2.xml><?xml version="1.0" encoding="utf-8"?>
 <p:sld xmlns:a="http://schemas.openxmlformats.org/drawingml/2006/main" xmlns:r="http://schemas.openxmlformats.org/officeDocument/2006/relationships" xmlns:p="http://schemas.openxmlformats.org/presentationml/2006/main">
   <p:cSld>
@@ -4386,12 +5113,12 @@
                         </a:spcAft>
                       </a:pPr>
                       <a:r>
-                        <a:rPr lang="en-US" sz="1400">
+                        <a:rPr lang="en-US" sz="1400" dirty="0">
                           <a:effectLst/>
                         </a:rPr>
                         <a:t>100%</a:t>
                       </a:r>
-                      <a:endParaRPr lang="en-US" sz="1400">
+                      <a:endParaRPr lang="en-US" sz="1400" dirty="0">
                         <a:effectLst/>
                         <a:latin typeface="Calibri" panose="020F0502020204030204" pitchFamily="34" charset="0"/>
                         <a:ea typeface="Calibri" panose="020F0502020204030204" pitchFamily="34" charset="0"/>
@@ -4418,10 +5145,10 @@
                         </a:spcAft>
                       </a:pPr>
                       <a:r>
-                        <a:rPr lang="en-US" sz="1400" dirty="0">
+                        <a:rPr lang="en-US" sz="1400" dirty="0" smtClean="0">
                           <a:effectLst/>
                         </a:rPr>
-                        <a:t>50%</a:t>
+                        <a:t>25%</a:t>
                       </a:r>
                       <a:endParaRPr lang="en-US" sz="1400" dirty="0">
                         <a:effectLst/>
@@ -4450,12 +5177,12 @@
                         </a:spcAft>
                       </a:pPr>
                       <a:r>
-                        <a:rPr lang="en-US" sz="1400">
+                        <a:rPr lang="en-US" sz="1400" dirty="0" smtClean="0">
                           <a:effectLst/>
                         </a:rPr>
-                        <a:t>50%</a:t>
+                        <a:t>25%</a:t>
                       </a:r>
-                      <a:endParaRPr lang="en-US" sz="1400">
+                      <a:endParaRPr lang="en-US" sz="1400" dirty="0">
                         <a:effectLst/>
                         <a:latin typeface="Calibri" panose="020F0502020204030204" pitchFamily="34" charset="0"/>
                         <a:ea typeface="Calibri" panose="020F0502020204030204" pitchFamily="34" charset="0"/>
@@ -4482,12 +5209,15 @@
                         </a:spcAft>
                       </a:pPr>
                       <a:r>
-                        <a:rPr lang="en-US" sz="1400">
+                        <a:rPr lang="en-US" sz="1400" dirty="0" smtClean="0">
                           <a:effectLst/>
+                          <a:latin typeface="+mn-lt"/>
+                          <a:ea typeface="+mn-ea"/>
+                          <a:cs typeface="+mn-cs"/>
                         </a:rPr>
-                        <a:t>0%</a:t>
+                        <a:t>25%</a:t>
                       </a:r>
-                      <a:endParaRPr lang="en-US" sz="1400">
+                      <a:endParaRPr lang="en-US" sz="1400" dirty="0">
                         <a:effectLst/>
                         <a:latin typeface="Calibri" panose="020F0502020204030204" pitchFamily="34" charset="0"/>
                         <a:ea typeface="Calibri" panose="020F0502020204030204" pitchFamily="34" charset="0"/>
@@ -4514,10 +5244,13 @@
                         </a:spcAft>
                       </a:pPr>
                       <a:r>
-                        <a:rPr lang="en-US" sz="1400" dirty="0">
+                        <a:rPr lang="en-US" sz="1400" dirty="0" smtClean="0">
                           <a:effectLst/>
+                          <a:latin typeface="+mn-lt"/>
+                          <a:ea typeface="+mn-ea"/>
+                          <a:cs typeface="+mn-cs"/>
                         </a:rPr>
-                        <a:t>0%</a:t>
+                        <a:t>25%</a:t>
                       </a:r>
                       <a:endParaRPr lang="en-US" sz="1400" dirty="0">
                         <a:effectLst/>
@@ -4618,12 +5351,12 @@
                         </a:spcAft>
                       </a:pPr>
                       <a:r>
-                        <a:rPr lang="en-US" sz="1400">
+                        <a:rPr lang="en-US" sz="1400" dirty="0">
                           <a:effectLst/>
                         </a:rPr>
                         <a:t>100%</a:t>
                       </a:r>
-                      <a:endParaRPr lang="en-US" sz="1400">
+                      <a:endParaRPr lang="en-US" sz="1400" dirty="0">
                         <a:effectLst/>
                         <a:latin typeface="Calibri" panose="020F0502020204030204" pitchFamily="34" charset="0"/>
                         <a:ea typeface="Calibri" panose="020F0502020204030204" pitchFamily="34" charset="0"/>
@@ -4650,10 +5383,13 @@
                         </a:spcAft>
                       </a:pPr>
                       <a:r>
-                        <a:rPr lang="en-US" sz="1400" dirty="0">
+                        <a:rPr lang="en-US" sz="1400" dirty="0" smtClean="0">
                           <a:effectLst/>
+                          <a:latin typeface="+mn-lt"/>
+                          <a:ea typeface="+mn-ea"/>
+                          <a:cs typeface="+mn-cs"/>
                         </a:rPr>
-                        <a:t>25%</a:t>
+                        <a:t>0%</a:t>
                       </a:r>
                       <a:endParaRPr lang="en-US" sz="1400" dirty="0">
                         <a:effectLst/>
@@ -4682,12 +5418,15 @@
                         </a:spcAft>
                       </a:pPr>
                       <a:r>
-                        <a:rPr lang="en-US" sz="1400">
+                        <a:rPr lang="en-US" sz="1400" dirty="0" smtClean="0">
                           <a:effectLst/>
+                          <a:latin typeface="+mn-lt"/>
+                          <a:ea typeface="+mn-ea"/>
+                          <a:cs typeface="+mn-cs"/>
                         </a:rPr>
-                        <a:t>25%</a:t>
+                        <a:t>0%</a:t>
                       </a:r>
-                      <a:endParaRPr lang="en-US" sz="1400">
+                      <a:endParaRPr lang="en-US" sz="1400" dirty="0">
                         <a:effectLst/>
                         <a:latin typeface="Calibri" panose="020F0502020204030204" pitchFamily="34" charset="0"/>
                         <a:ea typeface="Calibri" panose="020F0502020204030204" pitchFamily="34" charset="0"/>
@@ -4714,12 +5453,15 @@
                         </a:spcAft>
                       </a:pPr>
                       <a:r>
-                        <a:rPr lang="en-US" sz="1400">
+                        <a:rPr lang="en-US" sz="1400" dirty="0" smtClean="0">
                           <a:effectLst/>
+                          <a:latin typeface="+mn-lt"/>
+                          <a:ea typeface="+mn-ea"/>
+                          <a:cs typeface="+mn-cs"/>
                         </a:rPr>
-                        <a:t>25%</a:t>
+                        <a:t>50%</a:t>
                       </a:r>
-                      <a:endParaRPr lang="en-US" sz="1400">
+                      <a:endParaRPr lang="en-US" sz="1400" dirty="0">
                         <a:effectLst/>
                         <a:latin typeface="Calibri" panose="020F0502020204030204" pitchFamily="34" charset="0"/>
                         <a:ea typeface="Calibri" panose="020F0502020204030204" pitchFamily="34" charset="0"/>
@@ -4746,10 +5488,13 @@
                         </a:spcAft>
                       </a:pPr>
                       <a:r>
-                        <a:rPr lang="en-US" sz="1400" dirty="0">
+                        <a:rPr lang="en-US" sz="1400" dirty="0" smtClean="0">
                           <a:effectLst/>
+                          <a:latin typeface="+mn-lt"/>
+                          <a:ea typeface="+mn-ea"/>
+                          <a:cs typeface="+mn-cs"/>
                         </a:rPr>
-                        <a:t>25%</a:t>
+                        <a:t>50%</a:t>
                       </a:r>
                       <a:endParaRPr lang="en-US" sz="1400" dirty="0">
                         <a:effectLst/>
@@ -4845,38 +5590,16 @@
           <a:p>
             <a:r>
               <a:rPr lang="en-US" dirty="0" smtClean="0"/>
-              <a:t> </a:t>
+              <a:t>Milestone 1 Accomplishment Summary</a:t>
             </a:r>
             <a:endParaRPr lang="en-US" dirty="0"/>
-          </a:p>
-        </p:txBody>
-      </p:sp>
-      <p:sp>
-        <p:nvSpPr>
-          <p:cNvPr id="3" name="Content Placeholder 2"/>
-          <p:cNvSpPr>
-            <a:spLocks noGrp="1"/>
-          </p:cNvSpPr>
-          <p:nvPr>
-            <p:ph idx="1"/>
-          </p:nvPr>
-        </p:nvSpPr>
-        <p:spPr/>
-        <p:txBody>
-          <a:bodyPr/>
-          <a:lstStyle/>
-          <a:p>
-            <a:pPr marL="137160" lvl="0" indent="0">
-              <a:buNone/>
-            </a:pPr>
-            <a:endParaRPr lang="en-US" dirty="0" smtClean="0"/>
           </a:p>
         </p:txBody>
       </p:sp>
     </p:spTree>
     <p:extLst>
       <p:ext uri="{BB962C8B-B14F-4D97-AF65-F5344CB8AC3E}">
-        <p14:creationId xmlns:p14="http://schemas.microsoft.com/office/powerpoint/2010/main" xmlns="" val="3406739726"/>
+        <p14:creationId xmlns:p14="http://schemas.microsoft.com/office/powerpoint/2010/main" xmlns="" val="4270080904"/>
       </p:ext>
     </p:extLst>
   </p:cSld>
@@ -4919,8 +5642,8 @@
           <a:lstStyle/>
           <a:p>
             <a:r>
-              <a:rPr lang="en-US" dirty="0" smtClean="0"/>
-              <a:t> </a:t>
+              <a:rPr lang="en-US" u="sng" dirty="0" smtClean="0"/>
+              <a:t>Obtain Requirement Document From GE</a:t>
             </a:r>
             <a:endParaRPr lang="en-US" dirty="0"/>
           </a:p>
@@ -4928,40 +5651,78 @@
       </p:sp>
       <p:sp>
         <p:nvSpPr>
-          <p:cNvPr id="3" name="Content Placeholder 2"/>
-          <p:cNvSpPr>
-            <a:spLocks noGrp="1"/>
-          </p:cNvSpPr>
-          <p:nvPr>
-            <p:ph idx="1"/>
-          </p:nvPr>
+          <p:cNvPr id="7" name="TextBox 6"/>
+          <p:cNvSpPr txBox="1"/>
+          <p:nvPr/>
         </p:nvSpPr>
         <p:spPr>
           <a:xfrm>
-            <a:off x="609600" y="1574075"/>
-            <a:ext cx="10972800" cy="4709160"/>
+            <a:off x="406402" y="1451429"/>
+            <a:ext cx="11379198" cy="2954655"/>
           </a:xfrm>
+          <a:prstGeom prst="rect">
+            <a:avLst/>
+          </a:prstGeom>
+          <a:noFill/>
         </p:spPr>
         <p:txBody>
-          <a:bodyPr>
-            <a:normAutofit/>
+          <a:bodyPr wrap="square" rtlCol="0">
+            <a:spAutoFit/>
           </a:bodyPr>
           <a:lstStyle/>
           <a:p>
-            <a:pPr>
-              <a:buNone/>
-            </a:pPr>
-            <a:r>
-              <a:rPr lang="en-US" dirty="0" smtClean="0"/>
+            <a:r>
+              <a:rPr lang="en-US" sz="2800" dirty="0" smtClean="0"/>
+              <a:t>At the conclusion of our second team meeting with Dan </a:t>
+            </a:r>
+            <a:r>
+              <a:rPr lang="en-US" sz="2800" dirty="0" err="1" smtClean="0"/>
+              <a:t>Ballesty</a:t>
+            </a:r>
+            <a:r>
+              <a:rPr lang="en-US" sz="2800" dirty="0" smtClean="0"/>
+              <a:t>, he informed us that </a:t>
+            </a:r>
+            <a:r>
+              <a:rPr lang="en-US" sz="2800" dirty="0" smtClean="0"/>
+              <a:t>he would </a:t>
+            </a:r>
+            <a:r>
+              <a:rPr lang="en-US" sz="2800" dirty="0" smtClean="0"/>
+              <a:t>sit down with the subject matter experts at GE and decide on what functionality </a:t>
+            </a:r>
+            <a:r>
+              <a:rPr lang="en-US" sz="2800" dirty="0" smtClean="0"/>
+              <a:t>they wanted </a:t>
+            </a:r>
+            <a:r>
+              <a:rPr lang="en-US" sz="2800" dirty="0" smtClean="0"/>
+              <a:t>the tool to provide them. Shortly after the meeting we received an email containing </a:t>
+            </a:r>
+            <a:r>
+              <a:rPr lang="en-US" sz="2800" dirty="0" smtClean="0"/>
+              <a:t>the</a:t>
+            </a:r>
+          </a:p>
+          <a:p>
+            <a:r>
+              <a:rPr lang="en-US" sz="2800" dirty="0" smtClean="0"/>
               <a:t> </a:t>
             </a:r>
+            <a:r>
+              <a:rPr lang="en-US" sz="2800" dirty="0" smtClean="0"/>
+              <a:t>formalized list of requirements for the project. The document includes five requirements.</a:t>
+            </a:r>
+          </a:p>
+          <a:p>
+            <a:endParaRPr lang="en-US" dirty="0"/>
           </a:p>
         </p:txBody>
       </p:sp>
     </p:spTree>
     <p:extLst>
       <p:ext uri="{BB962C8B-B14F-4D97-AF65-F5344CB8AC3E}">
-        <p14:creationId xmlns:p14="http://schemas.microsoft.com/office/powerpoint/2010/main" xmlns="" val="1077630031"/>
+        <p14:creationId xmlns:p14="http://schemas.microsoft.com/office/powerpoint/2010/main" xmlns="" val="4270080904"/>
       </p:ext>
     </p:extLst>
   </p:cSld>
@@ -5000,36 +5761,19 @@
         </p:nvSpPr>
         <p:spPr/>
         <p:txBody>
-          <a:bodyPr/>
+          <a:bodyPr>
+            <a:normAutofit fontScale="90000"/>
+          </a:bodyPr>
           <a:lstStyle/>
           <a:p>
-            <a:endParaRPr lang="en-US"/>
-          </a:p>
-        </p:txBody>
-      </p:sp>
-      <p:pic>
-        <p:nvPicPr>
-          <p:cNvPr id="4" name="Content Placeholder 3" descr="gegreenmachine.jpg"/>
-          <p:cNvPicPr>
-            <a:picLocks noGrp="1" noChangeAspect="1"/>
-          </p:cNvPicPr>
-          <p:nvPr>
-            <p:ph idx="1"/>
-          </p:nvPr>
-        </p:nvPicPr>
-        <p:blipFill>
-          <a:blip r:embed="rId2" cstate="print"/>
-          <a:stretch>
-            <a:fillRect/>
-          </a:stretch>
-        </p:blipFill>
-        <p:spPr>
-          <a:xfrm>
-            <a:off x="0" y="1416"/>
-            <a:ext cx="12192000" cy="6856584"/>
-          </a:xfrm>
-        </p:spPr>
-      </p:pic>
+            <a:r>
+              <a:rPr lang="en-US" u="sng" dirty="0" smtClean="0"/>
+              <a:t>Decide on IDE/Programming Language/Database Tools</a:t>
+            </a:r>
+            <a:endParaRPr lang="en-US" dirty="0"/>
+          </a:p>
+        </p:txBody>
+      </p:sp>
       <p:sp>
         <p:nvSpPr>
           <p:cNvPr id="5" name="TextBox 4"/>
@@ -5038,8 +5782,8 @@
         </p:nvSpPr>
         <p:spPr>
           <a:xfrm>
-            <a:off x="7720148" y="248194"/>
-            <a:ext cx="3501280" cy="923330"/>
+            <a:off x="595085" y="1785258"/>
+            <a:ext cx="10892413" cy="4062651"/>
           </a:xfrm>
           <a:prstGeom prst="rect">
             <a:avLst/>
@@ -5047,31 +5791,81 @@
           <a:noFill/>
         </p:spPr>
         <p:txBody>
-          <a:bodyPr wrap="none" rtlCol="0">
+          <a:bodyPr wrap="square" rtlCol="0">
             <a:spAutoFit/>
           </a:bodyPr>
           <a:lstStyle/>
           <a:p>
             <a:r>
-              <a:rPr lang="en-US" sz="5400" dirty="0" smtClean="0">
-                <a:solidFill>
-                  <a:schemeClr val="bg1"/>
-                </a:solidFill>
-              </a:rPr>
-              <a:t>Milestones</a:t>
-            </a:r>
-            <a:endParaRPr lang="en-US" sz="5400" dirty="0">
-              <a:solidFill>
-                <a:schemeClr val="bg1"/>
-              </a:solidFill>
-            </a:endParaRPr>
+              <a:rPr lang="en-US" sz="2400" dirty="0" smtClean="0"/>
+              <a:t>At the beginning of our third meeting with Dan </a:t>
+            </a:r>
+            <a:r>
+              <a:rPr lang="en-US" sz="2400" dirty="0" err="1" smtClean="0"/>
+              <a:t>Ballesty</a:t>
+            </a:r>
+            <a:r>
+              <a:rPr lang="en-US" sz="2400" dirty="0" smtClean="0"/>
+              <a:t>, we reviewed the requirements document and held an open conversation as to which tools/IDE/programming language/database software would provide the greatest amount of ease throughout the project. The decisions that we made were</a:t>
+            </a:r>
+            <a:r>
+              <a:rPr lang="en-US" sz="2400" dirty="0" smtClean="0"/>
+              <a:t>:</a:t>
+            </a:r>
+          </a:p>
+          <a:p>
+            <a:endParaRPr lang="en-US" sz="2400" dirty="0" smtClean="0"/>
+          </a:p>
+          <a:p>
+            <a:pPr lvl="0"/>
+            <a:r>
+              <a:rPr lang="en-US" sz="2400" dirty="0" smtClean="0"/>
+              <a:t>IDE</a:t>
+            </a:r>
+            <a:r>
+              <a:rPr lang="en-US" sz="2400" dirty="0" smtClean="0"/>
+              <a:t>:  </a:t>
+            </a:r>
+            <a:r>
+              <a:rPr lang="en-US" sz="2400" dirty="0" smtClean="0"/>
+              <a:t>Visual Studio</a:t>
+            </a:r>
+          </a:p>
+          <a:p>
+            <a:pPr lvl="0"/>
+            <a:r>
+              <a:rPr lang="en-US" sz="2400" dirty="0" smtClean="0"/>
+              <a:t>Programming Language: C#/.NET</a:t>
+            </a:r>
+          </a:p>
+          <a:p>
+            <a:pPr lvl="0"/>
+            <a:r>
+              <a:rPr lang="en-US" sz="2400" dirty="0" smtClean="0"/>
+              <a:t>Tools: Windows Forms (For GUI), Photoshop for GUI design</a:t>
+            </a:r>
+          </a:p>
+          <a:p>
+            <a:pPr lvl="0"/>
+            <a:r>
+              <a:rPr lang="en-US" sz="2400" dirty="0" smtClean="0"/>
+              <a:t>Database Tools: </a:t>
+            </a:r>
+            <a:r>
+              <a:rPr lang="en-US" sz="2400" dirty="0" err="1" smtClean="0"/>
+              <a:t>MySQL</a:t>
+            </a:r>
+            <a:endParaRPr lang="en-US" sz="2400" dirty="0" smtClean="0"/>
+          </a:p>
+          <a:p>
+            <a:endParaRPr lang="en-US" dirty="0"/>
           </a:p>
         </p:txBody>
       </p:sp>
     </p:spTree>
     <p:extLst>
       <p:ext uri="{BB962C8B-B14F-4D97-AF65-F5344CB8AC3E}">
-        <p14:creationId xmlns:p14="http://schemas.microsoft.com/office/powerpoint/2010/main" xmlns="" val="1202250340"/>
+        <p14:creationId xmlns:p14="http://schemas.microsoft.com/office/powerpoint/2010/main" xmlns="" val="4270080904"/>
       </p:ext>
     </p:extLst>
   </p:cSld>
@@ -5110,12 +5904,14 @@
         </p:nvSpPr>
         <p:spPr/>
         <p:txBody>
-          <a:bodyPr/>
+          <a:bodyPr>
+            <a:normAutofit fontScale="90000"/>
+          </a:bodyPr>
           <a:lstStyle/>
           <a:p>
             <a:r>
-              <a:rPr lang="en-US" dirty="0" smtClean="0"/>
-              <a:t>Milestone 2</a:t>
+              <a:rPr lang="en-US" u="sng" dirty="0" smtClean="0"/>
+              <a:t>Evaluate Selected Tools with Small Examples to Analyze Integration/Cohesiveness of Tools:</a:t>
             </a:r>
             <a:endParaRPr lang="en-US" dirty="0"/>
           </a:p>
@@ -5123,43 +5919,38 @@
       </p:sp>
       <p:sp>
         <p:nvSpPr>
-          <p:cNvPr id="3" name="Content Placeholder 2"/>
-          <p:cNvSpPr>
-            <a:spLocks noGrp="1"/>
-          </p:cNvSpPr>
-          <p:nvPr>
-            <p:ph idx="1"/>
-          </p:nvPr>
-        </p:nvSpPr>
-        <p:spPr/>
-        <p:txBody>
-          <a:bodyPr/>
+          <p:cNvPr id="5" name="TextBox 4"/>
+          <p:cNvSpPr txBox="1"/>
+          <p:nvPr/>
+        </p:nvSpPr>
+        <p:spPr>
+          <a:xfrm>
+            <a:off x="595085" y="1785258"/>
+            <a:ext cx="10892413" cy="2215991"/>
+          </a:xfrm>
+          <a:prstGeom prst="rect">
+            <a:avLst/>
+          </a:prstGeom>
+          <a:noFill/>
+        </p:spPr>
+        <p:txBody>
+          <a:bodyPr wrap="square" rtlCol="0">
+            <a:spAutoFit/>
+          </a:bodyPr>
           <a:lstStyle/>
           <a:p>
             <a:r>
-              <a:rPr lang="en-US" dirty="0" smtClean="0"/>
-              <a:t>Parsing the database - </a:t>
-            </a:r>
-            <a:r>
-              <a:rPr lang="en-US" dirty="0"/>
-              <a:t>Take our skeleton infrastructure of a database and add to it the functionality of information retrieval. Set it up so that the user can enter query commands and actually retrieve information stored in the database.</a:t>
-            </a:r>
-          </a:p>
-          <a:p>
-            <a:r>
-              <a:rPr lang="en-US" dirty="0" smtClean="0"/>
-              <a:t>Do a GUI mockup and present to GE - </a:t>
-            </a:r>
-            <a:r>
-              <a:rPr lang="en-US" dirty="0"/>
-              <a:t>Take our design documents of our GUI that we created in Photoshop and implement it into C# code. After completing the implementation, we will present it to Dan Ballesty for review and critique.</a:t>
-            </a:r>
-          </a:p>
-          <a:p>
-            <a:pPr marL="137160" lvl="0" indent="0">
-              <a:buNone/>
-            </a:pPr>
-            <a:endParaRPr lang="en-US" dirty="0" smtClean="0"/>
+              <a:rPr lang="en-US" sz="2400" dirty="0" smtClean="0"/>
+              <a:t>As far as small examples and code snippets, we currently have working C# code that implements some of the basic classes that GE requires. We have a basic GUI created using Windows Forms with File and Display functionality. We also have a basic code sample in C# that will establish a database connection with a </a:t>
+            </a:r>
+            <a:r>
+              <a:rPr lang="en-US" sz="2400" dirty="0" err="1" smtClean="0"/>
+              <a:t>MySQL</a:t>
+            </a:r>
+            <a:r>
+              <a:rPr lang="en-US" sz="2400" dirty="0" smtClean="0"/>
+              <a:t> database and allow a user to enter queries. </a:t>
+            </a:r>
           </a:p>
           <a:p>
             <a:endParaRPr lang="en-US" dirty="0"/>
@@ -5167,6 +5958,11 @@
         </p:txBody>
       </p:sp>
     </p:spTree>
+    <p:extLst>
+      <p:ext uri="{BB962C8B-B14F-4D97-AF65-F5344CB8AC3E}">
+        <p14:creationId xmlns:p14="http://schemas.microsoft.com/office/powerpoint/2010/main" xmlns="" val="4270080904"/>
+      </p:ext>
+    </p:extLst>
   </p:cSld>
   <p:clrMapOvr>
     <a:masterClrMapping/>
@@ -5201,12 +5997,7 @@
             <p:ph type="title"/>
           </p:nvPr>
         </p:nvSpPr>
-        <p:spPr>
-          <a:xfrm>
-            <a:off x="1619794" y="0"/>
-            <a:ext cx="8878388" cy="731520"/>
-          </a:xfrm>
-        </p:spPr>
+        <p:spPr/>
         <p:txBody>
           <a:bodyPr>
             <a:normAutofit/>
@@ -5214,497 +6005,51 @@
           <a:lstStyle/>
           <a:p>
             <a:r>
-              <a:rPr lang="en-US" sz="3600" dirty="0" smtClean="0"/>
-              <a:t>Milestone 2 Role Distribution</a:t>
-            </a:r>
-            <a:endParaRPr lang="en-US" sz="3600" dirty="0"/>
-          </a:p>
-        </p:txBody>
-      </p:sp>
-      <p:graphicFrame>
-        <p:nvGraphicFramePr>
-          <p:cNvPr id="4" name="Content Placeholder 3"/>
-          <p:cNvGraphicFramePr>
-            <a:graphicFrameLocks noGrp="1"/>
-          </p:cNvGraphicFramePr>
-          <p:nvPr>
-            <p:ph idx="1"/>
-            <p:extLst>
-              <p:ext uri="{D42A27DB-BD31-4B8C-83A1-F6EECF244321}">
-                <p14:modId xmlns:p14="http://schemas.microsoft.com/office/powerpoint/2010/main" xmlns="" val="761006259"/>
-              </p:ext>
-            </p:extLst>
-          </p:nvPr>
-        </p:nvGraphicFramePr>
-        <p:xfrm>
-          <a:off x="361406" y="1892953"/>
-          <a:ext cx="11373395" cy="3307515"/>
-        </p:xfrm>
-        <a:graphic>
-          <a:graphicData uri="http://schemas.openxmlformats.org/drawingml/2006/table">
-            <a:tbl>
-              <a:tblPr firstRow="1" bandRow="1">
-                <a:tableStyleId>{5C22544A-7EE6-4342-B048-85BDC9FD1C3A}</a:tableStyleId>
-              </a:tblPr>
-              <a:tblGrid>
-                <a:gridCol w="2274679"/>
-                <a:gridCol w="2274679"/>
-                <a:gridCol w="2274679"/>
-                <a:gridCol w="2274679"/>
-                <a:gridCol w="2274679"/>
-              </a:tblGrid>
-              <a:tr h="1102505">
-                <a:tc>
-                  <a:txBody>
-                    <a:bodyPr/>
-                    <a:lstStyle/>
-                    <a:p>
-                      <a:r>
-                        <a:rPr lang="en-US" sz="2400" dirty="0" smtClean="0"/>
-                        <a:t>Task</a:t>
-                      </a:r>
-                      <a:endParaRPr lang="en-US" sz="2400" dirty="0"/>
-                    </a:p>
-                  </a:txBody>
-                  <a:tcPr/>
-                </a:tc>
-                <a:tc>
-                  <a:txBody>
-                    <a:bodyPr/>
-                    <a:lstStyle/>
-                    <a:p>
-                      <a:r>
-                        <a:rPr lang="en-US" sz="2400" dirty="0" smtClean="0"/>
-                        <a:t>Chad</a:t>
-                      </a:r>
-                      <a:endParaRPr lang="en-US" sz="2400" dirty="0"/>
-                    </a:p>
-                  </a:txBody>
-                  <a:tcPr/>
-                </a:tc>
-                <a:tc>
-                  <a:txBody>
-                    <a:bodyPr/>
-                    <a:lstStyle/>
-                    <a:p>
-                      <a:r>
-                        <a:rPr lang="en-US" sz="2400" dirty="0" smtClean="0"/>
-                        <a:t>Ken</a:t>
-                      </a:r>
-                      <a:endParaRPr lang="en-US" sz="2400" dirty="0"/>
-                    </a:p>
-                  </a:txBody>
-                  <a:tcPr/>
-                </a:tc>
-                <a:tc>
-                  <a:txBody>
-                    <a:bodyPr/>
-                    <a:lstStyle/>
-                    <a:p>
-                      <a:r>
-                        <a:rPr lang="en-US" sz="2400" dirty="0" smtClean="0"/>
-                        <a:t>Chris</a:t>
-                      </a:r>
-                      <a:endParaRPr lang="en-US" sz="2400" dirty="0"/>
-                    </a:p>
-                  </a:txBody>
-                  <a:tcPr/>
-                </a:tc>
-                <a:tc>
-                  <a:txBody>
-                    <a:bodyPr/>
-                    <a:lstStyle/>
-                    <a:p>
-                      <a:r>
-                        <a:rPr lang="en-US" sz="2400" dirty="0" smtClean="0"/>
-                        <a:t>Zach</a:t>
-                      </a:r>
-                      <a:endParaRPr lang="en-US" sz="2400" dirty="0"/>
-                    </a:p>
-                  </a:txBody>
-                  <a:tcPr/>
-                </a:tc>
-              </a:tr>
-              <a:tr h="1102505">
-                <a:tc>
-                  <a:txBody>
-                    <a:bodyPr/>
-                    <a:lstStyle/>
-                    <a:p>
-                      <a:pPr marL="0" marR="0" indent="0" algn="l" defTabSz="914400" rtl="0" eaLnBrk="1" fontAlgn="auto" latinLnBrk="0" hangingPunct="1">
-                        <a:lnSpc>
-                          <a:spcPct val="100000"/>
-                        </a:lnSpc>
-                        <a:spcBef>
-                          <a:spcPts val="0"/>
-                        </a:spcBef>
-                        <a:spcAft>
-                          <a:spcPts val="0"/>
-                        </a:spcAft>
-                        <a:buClrTx/>
-                        <a:buSzTx/>
-                        <a:buFontTx/>
-                        <a:buNone/>
-                        <a:tabLst/>
-                        <a:defRPr/>
-                      </a:pPr>
-                      <a:r>
-                        <a:rPr kumimoji="0" lang="en-US" sz="1400" kern="1200" dirty="0" smtClean="0">
-                          <a:solidFill>
-                            <a:schemeClr val="dk1"/>
-                          </a:solidFill>
-                          <a:latin typeface="+mn-lt"/>
-                          <a:ea typeface="+mn-ea"/>
-                          <a:cs typeface="+mn-cs"/>
-                        </a:rPr>
-                        <a:t>Parsing the</a:t>
-                      </a:r>
-                      <a:r>
-                        <a:rPr kumimoji="0" lang="en-US" sz="1400" kern="1200" baseline="0" dirty="0" smtClean="0">
-                          <a:solidFill>
-                            <a:schemeClr val="dk1"/>
-                          </a:solidFill>
-                          <a:latin typeface="+mn-lt"/>
-                          <a:ea typeface="+mn-ea"/>
-                          <a:cs typeface="+mn-cs"/>
-                        </a:rPr>
-                        <a:t> Database information</a:t>
-                      </a:r>
-                      <a:endParaRPr kumimoji="0" lang="en-US" sz="1400" kern="1200" dirty="0" smtClean="0">
-                        <a:solidFill>
-                          <a:schemeClr val="dk1"/>
-                        </a:solidFill>
-                        <a:latin typeface="+mn-lt"/>
-                        <a:ea typeface="+mn-ea"/>
-                        <a:cs typeface="+mn-cs"/>
-                      </a:endParaRPr>
-                    </a:p>
-                    <a:p>
-                      <a:endParaRPr lang="en-US" dirty="0"/>
-                    </a:p>
-                  </a:txBody>
-                  <a:tcPr/>
-                </a:tc>
-                <a:tc>
-                  <a:txBody>
-                    <a:bodyPr/>
-                    <a:lstStyle/>
-                    <a:p>
-                      <a:pPr algn="ctr"/>
-                      <a:r>
-                        <a:rPr lang="en-US" dirty="0" smtClean="0"/>
-                        <a:t>-</a:t>
-                      </a:r>
-                      <a:endParaRPr lang="en-US" dirty="0"/>
-                    </a:p>
-                  </a:txBody>
-                  <a:tcPr/>
-                </a:tc>
-                <a:tc>
-                  <a:txBody>
-                    <a:bodyPr/>
-                    <a:lstStyle/>
-                    <a:p>
-                      <a:pPr marL="0" marR="0" indent="0" algn="ctr" defTabSz="914400" rtl="0" eaLnBrk="1" fontAlgn="auto" latinLnBrk="0" hangingPunct="1">
-                        <a:lnSpc>
-                          <a:spcPct val="100000"/>
-                        </a:lnSpc>
-                        <a:spcBef>
-                          <a:spcPts val="0"/>
-                        </a:spcBef>
-                        <a:spcAft>
-                          <a:spcPts val="0"/>
-                        </a:spcAft>
-                        <a:buClrTx/>
-                        <a:buSzTx/>
-                        <a:buFontTx/>
-                        <a:buNone/>
-                        <a:tabLst/>
-                        <a:defRPr/>
-                      </a:pPr>
-                      <a:r>
-                        <a:rPr lang="en-US" dirty="0" smtClean="0"/>
-                        <a:t>50%</a:t>
-                      </a:r>
-                    </a:p>
-                    <a:p>
-                      <a:pPr algn="ctr"/>
-                      <a:endParaRPr lang="en-US" dirty="0"/>
-                    </a:p>
-                  </a:txBody>
-                  <a:tcPr/>
-                </a:tc>
-                <a:tc>
-                  <a:txBody>
-                    <a:bodyPr/>
-                    <a:lstStyle/>
-                    <a:p>
-                      <a:pPr marL="0" marR="0" indent="0" algn="ctr" defTabSz="914400" rtl="0" eaLnBrk="1" fontAlgn="auto" latinLnBrk="0" hangingPunct="1">
-                        <a:lnSpc>
-                          <a:spcPct val="100000"/>
-                        </a:lnSpc>
-                        <a:spcBef>
-                          <a:spcPts val="0"/>
-                        </a:spcBef>
-                        <a:spcAft>
-                          <a:spcPts val="0"/>
-                        </a:spcAft>
-                        <a:buClrTx/>
-                        <a:buSzTx/>
-                        <a:buFontTx/>
-                        <a:buNone/>
-                        <a:tabLst/>
-                        <a:defRPr/>
-                      </a:pPr>
-                      <a:r>
-                        <a:rPr lang="en-US" dirty="0" smtClean="0"/>
-                        <a:t>50%</a:t>
-                      </a:r>
-                    </a:p>
-                    <a:p>
-                      <a:pPr algn="ctr"/>
-                      <a:endParaRPr lang="en-US" dirty="0"/>
-                    </a:p>
-                  </a:txBody>
-                  <a:tcPr/>
-                </a:tc>
-                <a:tc>
-                  <a:txBody>
-                    <a:bodyPr/>
-                    <a:lstStyle/>
-                    <a:p>
-                      <a:pPr marL="0" marR="0" indent="0" algn="ctr" defTabSz="914400" rtl="0" eaLnBrk="1" fontAlgn="auto" latinLnBrk="0" hangingPunct="1">
-                        <a:lnSpc>
-                          <a:spcPct val="100000"/>
-                        </a:lnSpc>
-                        <a:spcBef>
-                          <a:spcPts val="0"/>
-                        </a:spcBef>
-                        <a:spcAft>
-                          <a:spcPts val="0"/>
-                        </a:spcAft>
-                        <a:buClrTx/>
-                        <a:buSzTx/>
-                        <a:buFontTx/>
-                        <a:buNone/>
-                        <a:tabLst/>
-                        <a:defRPr/>
-                      </a:pPr>
-                      <a:r>
-                        <a:rPr lang="en-US" dirty="0" smtClean="0"/>
-                        <a:t>-</a:t>
-                      </a:r>
-                    </a:p>
-                    <a:p>
-                      <a:pPr algn="ctr"/>
-                      <a:endParaRPr lang="en-US" dirty="0"/>
-                    </a:p>
-                  </a:txBody>
-                  <a:tcPr/>
-                </a:tc>
-              </a:tr>
-              <a:tr h="1102505">
-                <a:tc>
-                  <a:txBody>
-                    <a:bodyPr/>
-                    <a:lstStyle/>
-                    <a:p>
-                      <a:pPr marL="0" marR="0" indent="0" algn="l" defTabSz="914400" rtl="0" eaLnBrk="1" fontAlgn="auto" latinLnBrk="0" hangingPunct="1">
-                        <a:lnSpc>
-                          <a:spcPct val="100000"/>
-                        </a:lnSpc>
-                        <a:spcBef>
-                          <a:spcPts val="0"/>
-                        </a:spcBef>
-                        <a:spcAft>
-                          <a:spcPts val="0"/>
-                        </a:spcAft>
-                        <a:buClrTx/>
-                        <a:buSzTx/>
-                        <a:buFontTx/>
-                        <a:buNone/>
-                        <a:tabLst/>
-                        <a:defRPr/>
-                      </a:pPr>
-                      <a:r>
-                        <a:rPr kumimoji="0" lang="en-US" sz="1400" kern="1200" dirty="0" smtClean="0">
-                          <a:solidFill>
-                            <a:schemeClr val="dk1"/>
-                          </a:solidFill>
-                          <a:latin typeface="+mn-lt"/>
-                          <a:ea typeface="+mn-ea"/>
-                          <a:cs typeface="+mn-cs"/>
-                        </a:rPr>
-                        <a:t>Do a GUI Mockup and</a:t>
-                      </a:r>
-                      <a:r>
-                        <a:rPr kumimoji="0" lang="en-US" sz="1400" kern="1200" baseline="0" dirty="0" smtClean="0">
-                          <a:solidFill>
-                            <a:schemeClr val="dk1"/>
-                          </a:solidFill>
-                          <a:latin typeface="+mn-lt"/>
-                          <a:ea typeface="+mn-ea"/>
-                          <a:cs typeface="+mn-cs"/>
-                        </a:rPr>
-                        <a:t> present to GE</a:t>
-                      </a:r>
-                      <a:endParaRPr kumimoji="0" lang="en-US" sz="1400" kern="1200" dirty="0" smtClean="0">
-                        <a:solidFill>
-                          <a:schemeClr val="dk1"/>
-                        </a:solidFill>
-                        <a:latin typeface="+mn-lt"/>
-                        <a:ea typeface="+mn-ea"/>
-                        <a:cs typeface="+mn-cs"/>
-                      </a:endParaRPr>
-                    </a:p>
-                    <a:p>
-                      <a:endParaRPr lang="en-US" dirty="0"/>
-                    </a:p>
-                  </a:txBody>
-                  <a:tcPr/>
-                </a:tc>
-                <a:tc>
-                  <a:txBody>
-                    <a:bodyPr/>
-                    <a:lstStyle/>
-                    <a:p>
-                      <a:pPr marL="0" marR="0" indent="0" algn="ctr" defTabSz="914400" rtl="0" eaLnBrk="1" fontAlgn="auto" latinLnBrk="0" hangingPunct="1">
-                        <a:lnSpc>
-                          <a:spcPct val="100000"/>
-                        </a:lnSpc>
-                        <a:spcBef>
-                          <a:spcPts val="0"/>
-                        </a:spcBef>
-                        <a:spcAft>
-                          <a:spcPts val="0"/>
-                        </a:spcAft>
-                        <a:buClrTx/>
-                        <a:buSzTx/>
-                        <a:buFontTx/>
-                        <a:buNone/>
-                        <a:tabLst/>
-                        <a:defRPr/>
-                      </a:pPr>
-                      <a:r>
-                        <a:rPr lang="en-US" dirty="0" smtClean="0"/>
-                        <a:t>50%</a:t>
-                      </a:r>
-                    </a:p>
-                    <a:p>
-                      <a:pPr algn="ctr"/>
-                      <a:endParaRPr lang="en-US" dirty="0"/>
-                    </a:p>
-                  </a:txBody>
-                  <a:tcPr/>
-                </a:tc>
-                <a:tc>
-                  <a:txBody>
-                    <a:bodyPr/>
-                    <a:lstStyle/>
-                    <a:p>
-                      <a:pPr marL="0" marR="0" indent="0" algn="ctr" defTabSz="914400" rtl="0" eaLnBrk="1" fontAlgn="auto" latinLnBrk="0" hangingPunct="1">
-                        <a:lnSpc>
-                          <a:spcPct val="100000"/>
-                        </a:lnSpc>
-                        <a:spcBef>
-                          <a:spcPts val="0"/>
-                        </a:spcBef>
-                        <a:spcAft>
-                          <a:spcPts val="0"/>
-                        </a:spcAft>
-                        <a:buClrTx/>
-                        <a:buSzTx/>
-                        <a:buFontTx/>
-                        <a:buNone/>
-                        <a:tabLst/>
-                        <a:defRPr/>
-                      </a:pPr>
-                      <a:r>
-                        <a:rPr lang="en-US" dirty="0" smtClean="0"/>
-                        <a:t>-</a:t>
-                      </a:r>
-                    </a:p>
-                    <a:p>
-                      <a:pPr algn="ctr"/>
-                      <a:endParaRPr lang="en-US" dirty="0"/>
-                    </a:p>
-                  </a:txBody>
-                  <a:tcPr/>
-                </a:tc>
-                <a:tc>
-                  <a:txBody>
-                    <a:bodyPr/>
-                    <a:lstStyle/>
-                    <a:p>
-                      <a:pPr marL="0" marR="0" indent="0" algn="ctr" defTabSz="914400" rtl="0" eaLnBrk="1" fontAlgn="auto" latinLnBrk="0" hangingPunct="1">
-                        <a:lnSpc>
-                          <a:spcPct val="100000"/>
-                        </a:lnSpc>
-                        <a:spcBef>
-                          <a:spcPts val="0"/>
-                        </a:spcBef>
-                        <a:spcAft>
-                          <a:spcPts val="0"/>
-                        </a:spcAft>
-                        <a:buClrTx/>
-                        <a:buSzTx/>
-                        <a:buFontTx/>
-                        <a:buNone/>
-                        <a:tabLst/>
-                        <a:defRPr/>
-                      </a:pPr>
-                      <a:r>
-                        <a:rPr lang="en-US" dirty="0" smtClean="0"/>
-                        <a:t>-</a:t>
-                      </a:r>
-                    </a:p>
-                    <a:p>
-                      <a:pPr algn="ctr"/>
-                      <a:endParaRPr lang="en-US" dirty="0"/>
-                    </a:p>
-                  </a:txBody>
-                  <a:tcPr/>
-                </a:tc>
-                <a:tc>
-                  <a:txBody>
-                    <a:bodyPr/>
-                    <a:lstStyle/>
-                    <a:p>
-                      <a:pPr marL="0" marR="0" indent="0" algn="ctr" defTabSz="914400" rtl="0" eaLnBrk="1" fontAlgn="auto" latinLnBrk="0" hangingPunct="1">
-                        <a:lnSpc>
-                          <a:spcPct val="100000"/>
-                        </a:lnSpc>
-                        <a:spcBef>
-                          <a:spcPts val="0"/>
-                        </a:spcBef>
-                        <a:spcAft>
-                          <a:spcPts val="0"/>
-                        </a:spcAft>
-                        <a:buClrTx/>
-                        <a:buSzTx/>
-                        <a:buFontTx/>
-                        <a:buNone/>
-                        <a:tabLst/>
-                        <a:defRPr/>
-                      </a:pPr>
-                      <a:r>
-                        <a:rPr lang="en-US" dirty="0" smtClean="0"/>
-                        <a:t>50%</a:t>
-                      </a:r>
-                    </a:p>
-                    <a:p>
-                      <a:pPr algn="ctr"/>
-                      <a:endParaRPr lang="en-US" dirty="0"/>
-                    </a:p>
-                  </a:txBody>
-                  <a:tcPr/>
-                </a:tc>
-              </a:tr>
-            </a:tbl>
-          </a:graphicData>
-        </a:graphic>
-      </p:graphicFrame>
+              <a:rPr lang="en-US" u="sng" dirty="0" smtClean="0"/>
+              <a:t>Begin Drafting Design of Program and GUI</a:t>
+            </a:r>
+            <a:endParaRPr lang="en-US" dirty="0"/>
+          </a:p>
+        </p:txBody>
+      </p:sp>
+      <p:sp>
+        <p:nvSpPr>
+          <p:cNvPr id="5" name="TextBox 4"/>
+          <p:cNvSpPr txBox="1"/>
+          <p:nvPr/>
+        </p:nvSpPr>
+        <p:spPr>
+          <a:xfrm>
+            <a:off x="595085" y="1785258"/>
+            <a:ext cx="10892413" cy="1477328"/>
+          </a:xfrm>
+          <a:prstGeom prst="rect">
+            <a:avLst/>
+          </a:prstGeom>
+          <a:noFill/>
+        </p:spPr>
+        <p:txBody>
+          <a:bodyPr wrap="square" rtlCol="0">
+            <a:spAutoFit/>
+          </a:bodyPr>
+          <a:lstStyle/>
+          <a:p>
+            <a:r>
+              <a:rPr lang="en-US" sz="2400" dirty="0" smtClean="0"/>
+              <a:t>With the help of GE professionals, we completed the SDP at the conclusion of our most recent meeting held on 2/14. We also put the finishing touches on both the GUI plan document, created in Photoshop, and the actual coded GUI.  </a:t>
+            </a:r>
+          </a:p>
+          <a:p>
+            <a:endParaRPr lang="en-US" dirty="0"/>
+          </a:p>
+        </p:txBody>
+      </p:sp>
     </p:spTree>
+    <p:extLst>
+      <p:ext uri="{BB962C8B-B14F-4D97-AF65-F5344CB8AC3E}">
+        <p14:creationId xmlns:p14="http://schemas.microsoft.com/office/powerpoint/2010/main" xmlns="" val="4270080904"/>
+      </p:ext>
+    </p:extLst>
   </p:cSld>
   <p:clrMapOvr>
     <a:masterClrMapping/>
@@ -5729,9 +6074,28 @@
           <a:chExt cx="0" cy="0"/>
         </a:xfrm>
       </p:grpSpPr>
+      <p:sp>
+        <p:nvSpPr>
+          <p:cNvPr id="2" name="Title 1"/>
+          <p:cNvSpPr>
+            <a:spLocks noGrp="1"/>
+          </p:cNvSpPr>
+          <p:nvPr>
+            <p:ph type="title"/>
+          </p:nvPr>
+        </p:nvSpPr>
+        <p:spPr/>
+        <p:txBody>
+          <a:bodyPr/>
+          <a:lstStyle/>
+          <a:p>
+            <a:endParaRPr lang="en-US"/>
+          </a:p>
+        </p:txBody>
+      </p:sp>
       <p:pic>
         <p:nvPicPr>
-          <p:cNvPr id="6" name="Content Placeholder 5" descr="getrains3.jpg"/>
+          <p:cNvPr id="4" name="Content Placeholder 3" descr="gegreenmachine.jpg"/>
           <p:cNvPicPr>
             <a:picLocks noGrp="1" noChangeAspect="1"/>
           </p:cNvPicPr>
@@ -5747,21 +6111,21 @@
         </p:blipFill>
         <p:spPr>
           <a:xfrm>
-            <a:off x="22706" y="5871"/>
-            <a:ext cx="12169294" cy="6794471"/>
+            <a:off x="0" y="1416"/>
+            <a:ext cx="12192000" cy="6856584"/>
           </a:xfrm>
         </p:spPr>
       </p:pic>
       <p:sp>
         <p:nvSpPr>
-          <p:cNvPr id="7" name="TextBox 6"/>
+          <p:cNvPr id="5" name="TextBox 4"/>
           <p:cNvSpPr txBox="1"/>
           <p:nvPr/>
         </p:nvSpPr>
         <p:spPr>
           <a:xfrm>
-            <a:off x="169818" y="195943"/>
-            <a:ext cx="5081840" cy="923330"/>
+            <a:off x="6791233" y="190137"/>
+            <a:ext cx="4871847" cy="923330"/>
           </a:xfrm>
           <a:prstGeom prst="rect">
             <a:avLst/>
@@ -5775,12 +6139,12 @@
           <a:lstStyle/>
           <a:p>
             <a:r>
-              <a:rPr lang="en-US" sz="5400" dirty="0" smtClean="0">
+              <a:rPr lang="en-US" sz="5400" smtClean="0">
                 <a:solidFill>
                   <a:schemeClr val="bg1"/>
                 </a:solidFill>
               </a:rPr>
-              <a:t>Any Questions?</a:t>
+              <a:t>Next Milestone</a:t>
             </a:r>
             <a:endParaRPr lang="en-US" sz="5400" dirty="0">
               <a:solidFill>
@@ -5791,6 +6155,11 @@
         </p:txBody>
       </p:sp>
     </p:spTree>
+    <p:extLst>
+      <p:ext uri="{BB962C8B-B14F-4D97-AF65-F5344CB8AC3E}">
+        <p14:creationId xmlns:p14="http://schemas.microsoft.com/office/powerpoint/2010/main" xmlns="" val="1202250340"/>
+      </p:ext>
+    </p:extLst>
   </p:cSld>
   <p:clrMapOvr>
     <a:masterClrMapping/>

</xml_diff>

<commit_message>
Moved some stuff around. Added some fake buttons on the main screen. Added to the presentation.
</commit_message>
<xml_diff>
--- a/Documents/Presentations/Milestone 1 presentation.pptx
+++ b/Documents/Presentations/Milestone 1 presentation.pptx
@@ -10,13 +10,14 @@
     <p:sldId id="266" r:id="rId4"/>
     <p:sldId id="267" r:id="rId5"/>
     <p:sldId id="268" r:id="rId6"/>
-    <p:sldId id="269" r:id="rId7"/>
-    <p:sldId id="270" r:id="rId8"/>
-    <p:sldId id="271" r:id="rId9"/>
-    <p:sldId id="260" r:id="rId10"/>
-    <p:sldId id="262" r:id="rId11"/>
-    <p:sldId id="264" r:id="rId12"/>
-    <p:sldId id="265" r:id="rId13"/>
+    <p:sldId id="272" r:id="rId7"/>
+    <p:sldId id="269" r:id="rId8"/>
+    <p:sldId id="270" r:id="rId9"/>
+    <p:sldId id="271" r:id="rId10"/>
+    <p:sldId id="260" r:id="rId11"/>
+    <p:sldId id="262" r:id="rId12"/>
+    <p:sldId id="264" r:id="rId13"/>
+    <p:sldId id="265" r:id="rId14"/>
   </p:sldIdLst>
   <p:sldSz cx="12192000" cy="6858000"/>
   <p:notesSz cx="6858000" cy="9144000"/>
@@ -246,7 +247,7 @@
             <a:fld id="{3F35B033-0387-4885-861A-442D43D51E29}" type="datetimeFigureOut">
               <a:rPr lang="en-US" smtClean="0"/>
               <a:pPr/>
-              <a:t>2/19/2014</a:t>
+              <a:t>2/26/2014</a:t>
             </a:fld>
             <a:endParaRPr lang="en-US"/>
           </a:p>
@@ -474,7 +475,7 @@
             <a:fld id="{3F35B033-0387-4885-861A-442D43D51E29}" type="datetimeFigureOut">
               <a:rPr lang="en-US" smtClean="0"/>
               <a:pPr/>
-              <a:t>2/19/2014</a:t>
+              <a:t>2/26/2014</a:t>
             </a:fld>
             <a:endParaRPr lang="en-US"/>
           </a:p>
@@ -651,7 +652,7 @@
             <a:fld id="{3F35B033-0387-4885-861A-442D43D51E29}" type="datetimeFigureOut">
               <a:rPr lang="en-US" smtClean="0"/>
               <a:pPr/>
-              <a:t>2/19/2014</a:t>
+              <a:t>2/26/2014</a:t>
             </a:fld>
             <a:endParaRPr lang="en-US"/>
           </a:p>
@@ -818,7 +819,7 @@
             <a:fld id="{3F35B033-0387-4885-861A-442D43D51E29}" type="datetimeFigureOut">
               <a:rPr lang="en-US" smtClean="0"/>
               <a:pPr/>
-              <a:t>2/19/2014</a:t>
+              <a:t>2/26/2014</a:t>
             </a:fld>
             <a:endParaRPr lang="en-US"/>
           </a:p>
@@ -1064,7 +1065,7 @@
             <a:fld id="{3F35B033-0387-4885-861A-442D43D51E29}" type="datetimeFigureOut">
               <a:rPr lang="en-US" smtClean="0"/>
               <a:pPr/>
-              <a:t>2/19/2014</a:t>
+              <a:t>2/26/2014</a:t>
             </a:fld>
             <a:endParaRPr lang="en-US"/>
           </a:p>
@@ -1330,7 +1331,7 @@
             <a:fld id="{3F35B033-0387-4885-861A-442D43D51E29}" type="datetimeFigureOut">
               <a:rPr lang="en-US" smtClean="0"/>
               <a:pPr/>
-              <a:t>2/19/2014</a:t>
+              <a:t>2/26/2014</a:t>
             </a:fld>
             <a:endParaRPr lang="en-US"/>
           </a:p>
@@ -1706,7 +1707,7 @@
             <a:fld id="{3F35B033-0387-4885-861A-442D43D51E29}" type="datetimeFigureOut">
               <a:rPr lang="en-US" smtClean="0"/>
               <a:pPr/>
-              <a:t>2/19/2014</a:t>
+              <a:t>2/26/2014</a:t>
             </a:fld>
             <a:endParaRPr lang="en-US"/>
           </a:p>
@@ -1821,7 +1822,7 @@
             <a:fld id="{3F35B033-0387-4885-861A-442D43D51E29}" type="datetimeFigureOut">
               <a:rPr lang="en-US" smtClean="0"/>
               <a:pPr/>
-              <a:t>2/19/2014</a:t>
+              <a:t>2/26/2014</a:t>
             </a:fld>
             <a:endParaRPr lang="en-US"/>
           </a:p>
@@ -1913,7 +1914,7 @@
             <a:fld id="{3F35B033-0387-4885-861A-442D43D51E29}" type="datetimeFigureOut">
               <a:rPr lang="en-US" smtClean="0"/>
               <a:pPr/>
-              <a:t>2/19/2014</a:t>
+              <a:t>2/26/2014</a:t>
             </a:fld>
             <a:endParaRPr lang="en-US"/>
           </a:p>
@@ -2173,7 +2174,7 @@
             <a:fld id="{3F35B033-0387-4885-861A-442D43D51E29}" type="datetimeFigureOut">
               <a:rPr lang="en-US" smtClean="0"/>
               <a:pPr/>
-              <a:t>2/19/2014</a:t>
+              <a:t>2/26/2014</a:t>
             </a:fld>
             <a:endParaRPr lang="en-US"/>
           </a:p>
@@ -2439,7 +2440,7 @@
             <a:fld id="{3F35B033-0387-4885-861A-442D43D51E29}" type="datetimeFigureOut">
               <a:rPr lang="en-US" smtClean="0"/>
               <a:pPr/>
-              <a:t>2/19/2014</a:t>
+              <a:t>2/26/2014</a:t>
             </a:fld>
             <a:endParaRPr lang="en-US"/>
           </a:p>
@@ -2658,7 +2659,7 @@
             <a:fld id="{3F35B033-0387-4885-861A-442D43D51E29}" type="datetimeFigureOut">
               <a:rPr lang="en-US" smtClean="0"/>
               <a:pPr/>
-              <a:t>2/19/2014</a:t>
+              <a:t>2/26/2014</a:t>
             </a:fld>
             <a:endParaRPr lang="en-US"/>
           </a:p>
@@ -3284,6 +3285,116 @@
           <a:bodyPr/>
           <a:lstStyle/>
           <a:p>
+            <a:endParaRPr lang="en-US"/>
+          </a:p>
+        </p:txBody>
+      </p:sp>
+      <p:pic>
+        <p:nvPicPr>
+          <p:cNvPr id="4" name="Content Placeholder 3" descr="gegreenmachine.jpg"/>
+          <p:cNvPicPr>
+            <a:picLocks noGrp="1" noChangeAspect="1"/>
+          </p:cNvPicPr>
+          <p:nvPr>
+            <p:ph idx="1"/>
+          </p:nvPr>
+        </p:nvPicPr>
+        <p:blipFill>
+          <a:blip r:embed="rId2" cstate="print"/>
+          <a:stretch>
+            <a:fillRect/>
+          </a:stretch>
+        </p:blipFill>
+        <p:spPr>
+          <a:xfrm>
+            <a:off x="0" y="1416"/>
+            <a:ext cx="12192000" cy="6856584"/>
+          </a:xfrm>
+        </p:spPr>
+      </p:pic>
+      <p:sp>
+        <p:nvSpPr>
+          <p:cNvPr id="5" name="TextBox 4"/>
+          <p:cNvSpPr txBox="1"/>
+          <p:nvPr/>
+        </p:nvSpPr>
+        <p:spPr>
+          <a:xfrm>
+            <a:off x="6791233" y="190137"/>
+            <a:ext cx="4871847" cy="923330"/>
+          </a:xfrm>
+          <a:prstGeom prst="rect">
+            <a:avLst/>
+          </a:prstGeom>
+          <a:noFill/>
+        </p:spPr>
+        <p:txBody>
+          <a:bodyPr wrap="none" rtlCol="0">
+            <a:spAutoFit/>
+          </a:bodyPr>
+          <a:lstStyle/>
+          <a:p>
+            <a:r>
+              <a:rPr lang="en-US" sz="5400" smtClean="0">
+                <a:solidFill>
+                  <a:schemeClr val="bg1"/>
+                </a:solidFill>
+              </a:rPr>
+              <a:t>Next Milestone</a:t>
+            </a:r>
+            <a:endParaRPr lang="en-US" sz="5400" dirty="0">
+              <a:solidFill>
+                <a:schemeClr val="bg1"/>
+              </a:solidFill>
+            </a:endParaRPr>
+          </a:p>
+        </p:txBody>
+      </p:sp>
+    </p:spTree>
+    <p:extLst>
+      <p:ext uri="{BB962C8B-B14F-4D97-AF65-F5344CB8AC3E}">
+        <p14:creationId xmlns:p14="http://schemas.microsoft.com/office/powerpoint/2010/main" val="1202250340"/>
+      </p:ext>
+    </p:extLst>
+  </p:cSld>
+  <p:clrMapOvr>
+    <a:masterClrMapping/>
+  </p:clrMapOvr>
+</p:sld>
+</file>
+
+<file path=ppt/slides/slide11.xml><?xml version="1.0" encoding="utf-8"?>
+<p:sld xmlns:a="http://schemas.openxmlformats.org/drawingml/2006/main" xmlns:r="http://schemas.openxmlformats.org/officeDocument/2006/relationships" xmlns:p="http://schemas.openxmlformats.org/presentationml/2006/main">
+  <p:cSld>
+    <p:spTree>
+      <p:nvGrpSpPr>
+        <p:cNvPr id="1" name=""/>
+        <p:cNvGrpSpPr/>
+        <p:nvPr/>
+      </p:nvGrpSpPr>
+      <p:grpSpPr>
+        <a:xfrm>
+          <a:off x="0" y="0"/>
+          <a:ext cx="0" cy="0"/>
+          <a:chOff x="0" y="0"/>
+          <a:chExt cx="0" cy="0"/>
+        </a:xfrm>
+      </p:grpSpPr>
+      <p:sp>
+        <p:nvSpPr>
+          <p:cNvPr id="2" name="Title 1"/>
+          <p:cNvSpPr>
+            <a:spLocks noGrp="1"/>
+          </p:cNvSpPr>
+          <p:nvPr>
+            <p:ph type="title"/>
+          </p:nvPr>
+        </p:nvSpPr>
+        <p:spPr/>
+        <p:txBody>
+          <a:bodyPr/>
+          <a:lstStyle/>
+          <a:p>
             <a:r>
               <a:rPr lang="en-US" dirty="0" smtClean="0"/>
               <a:t>Milestone 2</a:t>
@@ -3345,7 +3456,7 @@
 </p:sld>
 </file>
 
-<file path=ppt/slides/slide11.xml><?xml version="1.0" encoding="utf-8"?>
+<file path=ppt/slides/slide12.xml><?xml version="1.0" encoding="utf-8"?>
 <p:sld xmlns:a="http://schemas.openxmlformats.org/drawingml/2006/main" xmlns:r="http://schemas.openxmlformats.org/officeDocument/2006/relationships" xmlns:p="http://schemas.openxmlformats.org/presentationml/2006/main">
   <p:cSld>
     <p:spTree>
@@ -3883,7 +3994,7 @@
 </p:sld>
 </file>
 
-<file path=ppt/slides/slide12.xml><?xml version="1.0" encoding="utf-8"?>
+<file path=ppt/slides/slide13.xml><?xml version="1.0" encoding="utf-8"?>
 <p:sld xmlns:a="http://schemas.openxmlformats.org/drawingml/2006/main" xmlns:r="http://schemas.openxmlformats.org/officeDocument/2006/relationships" xmlns:p="http://schemas.openxmlformats.org/presentationml/2006/main">
   <p:cSld>
     <p:spTree>
@@ -5690,7 +5801,7 @@
         <p:spPr>
           <a:xfrm>
             <a:off x="406402" y="1451429"/>
-            <a:ext cx="11379198" cy="2954655"/>
+            <a:ext cx="11379198" cy="3385542"/>
           </a:xfrm>
           <a:prstGeom prst="rect">
             <a:avLst/>
@@ -5719,8 +5830,15 @@
           <a:p>
             <a:r>
               <a:rPr lang="en-US" sz="2800" dirty="0" smtClean="0"/>
-              <a:t> formalized list of requirements for the project. The document includes five requirements.</a:t>
-            </a:r>
+              <a:t> formalized list of requirements for the project. The document includes five requirements</a:t>
+            </a:r>
+            <a:r>
+              <a:rPr lang="en-US" sz="2800" dirty="0" smtClean="0"/>
+              <a:t>.</a:t>
+            </a:r>
+          </a:p>
+          <a:p>
+            <a:endParaRPr lang="en-US" sz="2800" dirty="0" smtClean="0"/>
           </a:p>
           <a:p>
             <a:endParaRPr lang="en-US" dirty="0"/>
@@ -5769,14 +5887,12 @@
         </p:nvSpPr>
         <p:spPr/>
         <p:txBody>
-          <a:bodyPr>
-            <a:normAutofit fontScale="90000"/>
-          </a:bodyPr>
+          <a:bodyPr/>
           <a:lstStyle/>
           <a:p>
             <a:r>
-              <a:rPr lang="en-US" u="sng" dirty="0" smtClean="0"/>
-              <a:t>Decide on IDE/Programming Language/Database Tools</a:t>
+              <a:rPr lang="en-US" dirty="0" smtClean="0"/>
+              <a:t>Requirements</a:t>
             </a:r>
             <a:endParaRPr lang="en-US" dirty="0"/>
           </a:p>
@@ -5784,84 +5900,57 @@
       </p:sp>
       <p:sp>
         <p:nvSpPr>
-          <p:cNvPr id="5" name="TextBox 4"/>
-          <p:cNvSpPr txBox="1"/>
-          <p:nvPr/>
-        </p:nvSpPr>
-        <p:spPr>
-          <a:xfrm>
-            <a:off x="595085" y="1785258"/>
-            <a:ext cx="10892413" cy="4062651"/>
-          </a:xfrm>
-          <a:prstGeom prst="rect">
-            <a:avLst/>
-          </a:prstGeom>
-          <a:noFill/>
-        </p:spPr>
-        <p:txBody>
-          <a:bodyPr wrap="square" rtlCol="0">
-            <a:spAutoFit/>
-          </a:bodyPr>
+          <p:cNvPr id="3" name="Content Placeholder 2"/>
+          <p:cNvSpPr>
+            <a:spLocks noGrp="1"/>
+          </p:cNvSpPr>
+          <p:nvPr>
+            <p:ph idx="1"/>
+          </p:nvPr>
+        </p:nvSpPr>
+        <p:spPr/>
+        <p:txBody>
+          <a:bodyPr/>
           <a:lstStyle/>
           <a:p>
             <a:r>
-              <a:rPr lang="en-US" sz="2400" dirty="0" smtClean="0"/>
-              <a:t>At the beginning of our third meeting with Dan </a:t>
-            </a:r>
-            <a:r>
-              <a:rPr lang="en-US" sz="2400" dirty="0" err="1" smtClean="0"/>
-              <a:t>Ballesty</a:t>
-            </a:r>
-            <a:r>
-              <a:rPr lang="en-US" sz="2400" dirty="0" smtClean="0"/>
-              <a:t>, we reviewed the requirements document and held an open conversation as to which tools/IDE/programming language/database software would provide the greatest amount of ease throughout the project. The decisions that we made were:</a:t>
-            </a:r>
-          </a:p>
-          <a:p>
-            <a:endParaRPr lang="en-US" sz="2400" dirty="0" smtClean="0"/>
-          </a:p>
-          <a:p>
-            <a:pPr lvl="0"/>
-            <a:r>
-              <a:rPr lang="en-US" sz="2400" dirty="0" smtClean="0"/>
-              <a:t>IDE:  Visual Studio</a:t>
-            </a:r>
-          </a:p>
-          <a:p>
-            <a:pPr lvl="0"/>
-            <a:r>
-              <a:rPr lang="en-US" sz="2400" dirty="0" smtClean="0"/>
-              <a:t>Programming Language: C#/.NET</a:t>
-            </a:r>
-          </a:p>
-          <a:p>
-            <a:pPr lvl="0"/>
-            <a:r>
-              <a:rPr lang="en-US" sz="2400" dirty="0" smtClean="0"/>
-              <a:t>Tools: Windows Forms (For GUI), Photoshop for GUI design</a:t>
-            </a:r>
-          </a:p>
-          <a:p>
-            <a:pPr lvl="0"/>
-            <a:r>
-              <a:rPr lang="en-US" sz="2400" dirty="0" smtClean="0"/>
-              <a:t>Database Tools: </a:t>
-            </a:r>
-            <a:r>
-              <a:rPr lang="en-US" sz="2400" dirty="0" err="1" smtClean="0"/>
-              <a:t>MySQL</a:t>
-            </a:r>
-            <a:endParaRPr lang="en-US" sz="2400" dirty="0" smtClean="0"/>
-          </a:p>
-          <a:p>
-            <a:endParaRPr lang="en-US" dirty="0"/>
+              <a:rPr lang="en-US" dirty="0" smtClean="0"/>
+              <a:t>1. Safe breaking Distance</a:t>
+            </a:r>
+          </a:p>
+          <a:p>
+            <a:r>
+              <a:rPr lang="en-US" dirty="0" smtClean="0"/>
+              <a:t>2. Headway Calculations</a:t>
+            </a:r>
+          </a:p>
+          <a:p>
+            <a:r>
+              <a:rPr lang="en-US" dirty="0" smtClean="0"/>
+              <a:t>3. Runtime Performance Calculations</a:t>
+            </a:r>
+          </a:p>
+          <a:p>
+            <a:r>
+              <a:rPr lang="en-US" dirty="0" smtClean="0"/>
+              <a:t>4. Clear Time Calculations</a:t>
+            </a:r>
+          </a:p>
+          <a:p>
+            <a:r>
+              <a:rPr lang="en-US" dirty="0" smtClean="0"/>
+              <a:t>5. Approach Locking Time Calculations</a:t>
+            </a:r>
+          </a:p>
+          <a:p>
+            <a:endParaRPr lang="en-US" dirty="0" smtClean="0"/>
           </a:p>
         </p:txBody>
       </p:sp>
     </p:spTree>
     <p:extLst>
       <p:ext uri="{BB962C8B-B14F-4D97-AF65-F5344CB8AC3E}">
-        <p14:creationId xmlns:p14="http://schemas.microsoft.com/office/powerpoint/2010/main" val="4270080904"/>
+        <p14:creationId xmlns:p14="http://schemas.microsoft.com/office/powerpoint/2010/main" val="207691532"/>
       </p:ext>
     </p:extLst>
   </p:cSld>
@@ -5907,7 +5996,7 @@
           <a:p>
             <a:r>
               <a:rPr lang="en-US" u="sng" dirty="0" smtClean="0"/>
-              <a:t>Evaluate Selected Tools with Small Examples to Analyze Integration/Cohesiveness of Tools:</a:t>
+              <a:t>Decide on IDE/Programming Language/Database Tools</a:t>
             </a:r>
             <a:endParaRPr lang="en-US" dirty="0"/>
           </a:p>
@@ -5922,7 +6011,7 @@
         <p:spPr>
           <a:xfrm>
             <a:off x="595085" y="1785258"/>
-            <a:ext cx="10892413" cy="2215991"/>
+            <a:ext cx="10892413" cy="4062651"/>
           </a:xfrm>
           <a:prstGeom prst="rect">
             <a:avLst/>
@@ -5937,16 +6026,52 @@
           <a:p>
             <a:r>
               <a:rPr lang="en-US" sz="2400" dirty="0" smtClean="0"/>
-              <a:t>As far as small examples and code snippets, we currently have working C# code that implements some of the basic classes that GE requires. We have a basic GUI created using Windows Forms with File and Display functionality. We also have a basic code sample in C# that will establish a database connection with a </a:t>
+              <a:t>At the beginning of our third meeting with Dan </a:t>
+            </a:r>
+            <a:r>
+              <a:rPr lang="en-US" sz="2400" dirty="0" err="1" smtClean="0"/>
+              <a:t>Ballesty</a:t>
+            </a:r>
+            <a:r>
+              <a:rPr lang="en-US" sz="2400" dirty="0" smtClean="0"/>
+              <a:t>, we reviewed the requirements document and held an open conversation as to which tools/IDE/programming language/database software would provide the greatest amount of ease throughout the project. The decisions that we made were:</a:t>
+            </a:r>
+          </a:p>
+          <a:p>
+            <a:endParaRPr lang="en-US" sz="2400" dirty="0" smtClean="0"/>
+          </a:p>
+          <a:p>
+            <a:pPr lvl="0"/>
+            <a:r>
+              <a:rPr lang="en-US" sz="2400" dirty="0" smtClean="0"/>
+              <a:t>IDE:  Visual Studio</a:t>
+            </a:r>
+          </a:p>
+          <a:p>
+            <a:pPr lvl="0"/>
+            <a:r>
+              <a:rPr lang="en-US" sz="2400" dirty="0" smtClean="0"/>
+              <a:t>Programming Language: C#/.NET</a:t>
+            </a:r>
+          </a:p>
+          <a:p>
+            <a:pPr lvl="0"/>
+            <a:r>
+              <a:rPr lang="en-US" sz="2400" dirty="0" smtClean="0"/>
+              <a:t>Tools: Windows Forms (For GUI), Photoshop for GUI design</a:t>
+            </a:r>
+          </a:p>
+          <a:p>
+            <a:pPr lvl="0"/>
+            <a:r>
+              <a:rPr lang="en-US" sz="2400" dirty="0" smtClean="0"/>
+              <a:t>Database Tools: </a:t>
             </a:r>
             <a:r>
               <a:rPr lang="en-US" sz="2400" dirty="0" err="1" smtClean="0"/>
               <a:t>MySQL</a:t>
             </a:r>
-            <a:r>
-              <a:rPr lang="en-US" sz="2400" dirty="0" smtClean="0"/>
-              <a:t> database and allow a user to enter queries. </a:t>
-            </a:r>
+            <a:endParaRPr lang="en-US" sz="2400" dirty="0" smtClean="0"/>
           </a:p>
           <a:p>
             <a:endParaRPr lang="en-US" dirty="0"/>
@@ -6002,7 +6127,7 @@
           <a:p>
             <a:r>
               <a:rPr lang="en-US" u="sng" dirty="0" smtClean="0"/>
-              <a:t>Begin Drafting Design of Program and GUI</a:t>
+              <a:t>Evaluate Selected Tools with Small Examples to Analyze Integration/Cohesiveness of Tools:</a:t>
             </a:r>
             <a:endParaRPr lang="en-US" dirty="0"/>
           </a:p>
@@ -6017,7 +6142,7 @@
         <p:spPr>
           <a:xfrm>
             <a:off x="595085" y="1785258"/>
-            <a:ext cx="10892413" cy="1477328"/>
+            <a:ext cx="10892413" cy="2215991"/>
           </a:xfrm>
           <a:prstGeom prst="rect">
             <a:avLst/>
@@ -6032,7 +6157,15 @@
           <a:p>
             <a:r>
               <a:rPr lang="en-US" sz="2400" dirty="0" smtClean="0"/>
-              <a:t>With the help of GE professionals, we completed the SDP at the conclusion of our most recent meeting held on 2/14. We also put the finishing touches on both the GUI plan document, created in Photoshop, and the actual coded GUI.  </a:t>
+              <a:t>As far as small examples and code snippets, we currently have working C# code that implements some of the basic classes that GE requires. We have a basic GUI created using Windows Forms with File and Display functionality. We also have a basic code sample in C# that will establish a database connection with a </a:t>
+            </a:r>
+            <a:r>
+              <a:rPr lang="en-US" sz="2400" dirty="0" err="1" smtClean="0"/>
+              <a:t>MySQL</a:t>
+            </a:r>
+            <a:r>
+              <a:rPr lang="en-US" sz="2400" dirty="0" smtClean="0"/>
+              <a:t> database and allow a user to enter queries. </a:t>
             </a:r>
           </a:p>
           <a:p>
@@ -6082,36 +6215,19 @@
         </p:nvSpPr>
         <p:spPr/>
         <p:txBody>
-          <a:bodyPr/>
+          <a:bodyPr>
+            <a:normAutofit fontScale="90000"/>
+          </a:bodyPr>
           <a:lstStyle/>
           <a:p>
-            <a:endParaRPr lang="en-US"/>
-          </a:p>
-        </p:txBody>
-      </p:sp>
-      <p:pic>
-        <p:nvPicPr>
-          <p:cNvPr id="4" name="Content Placeholder 3" descr="gegreenmachine.jpg"/>
-          <p:cNvPicPr>
-            <a:picLocks noGrp="1" noChangeAspect="1"/>
-          </p:cNvPicPr>
-          <p:nvPr>
-            <p:ph idx="1"/>
-          </p:nvPr>
-        </p:nvPicPr>
-        <p:blipFill>
-          <a:blip r:embed="rId2" cstate="print"/>
-          <a:stretch>
-            <a:fillRect/>
-          </a:stretch>
-        </p:blipFill>
-        <p:spPr>
-          <a:xfrm>
-            <a:off x="0" y="1416"/>
-            <a:ext cx="12192000" cy="6856584"/>
-          </a:xfrm>
-        </p:spPr>
-      </p:pic>
+            <a:r>
+              <a:rPr lang="en-US" u="sng" dirty="0" smtClean="0"/>
+              <a:t>Begin Drafting Design of Program and GUI</a:t>
+            </a:r>
+            <a:endParaRPr lang="en-US" dirty="0"/>
+          </a:p>
+        </p:txBody>
+      </p:sp>
       <p:sp>
         <p:nvSpPr>
           <p:cNvPr id="5" name="TextBox 4"/>
@@ -6120,8 +6236,8 @@
         </p:nvSpPr>
         <p:spPr>
           <a:xfrm>
-            <a:off x="6791233" y="190137"/>
-            <a:ext cx="4871847" cy="923330"/>
+            <a:off x="595085" y="1785258"/>
+            <a:ext cx="10892413" cy="1477328"/>
           </a:xfrm>
           <a:prstGeom prst="rect">
             <a:avLst/>
@@ -6129,31 +6245,25 @@
           <a:noFill/>
         </p:spPr>
         <p:txBody>
-          <a:bodyPr wrap="none" rtlCol="0">
+          <a:bodyPr wrap="square" rtlCol="0">
             <a:spAutoFit/>
           </a:bodyPr>
           <a:lstStyle/>
           <a:p>
             <a:r>
-              <a:rPr lang="en-US" sz="5400" smtClean="0">
-                <a:solidFill>
-                  <a:schemeClr val="bg1"/>
-                </a:solidFill>
-              </a:rPr>
-              <a:t>Next Milestone</a:t>
-            </a:r>
-            <a:endParaRPr lang="en-US" sz="5400" dirty="0">
-              <a:solidFill>
-                <a:schemeClr val="bg1"/>
-              </a:solidFill>
-            </a:endParaRPr>
+              <a:rPr lang="en-US" sz="2400" dirty="0" smtClean="0"/>
+              <a:t>With the help of GE professionals, we completed the SDP at the conclusion of our most recent meeting held on 2/14. We also put the finishing touches on both the GUI plan document, created in Photoshop, and the actual coded GUI.  </a:t>
+            </a:r>
+          </a:p>
+          <a:p>
+            <a:endParaRPr lang="en-US" dirty="0"/>
           </a:p>
         </p:txBody>
       </p:sp>
     </p:spTree>
     <p:extLst>
       <p:ext uri="{BB962C8B-B14F-4D97-AF65-F5344CB8AC3E}">
-        <p14:creationId xmlns:p14="http://schemas.microsoft.com/office/powerpoint/2010/main" val="1202250340"/>
+        <p14:creationId xmlns:p14="http://schemas.microsoft.com/office/powerpoint/2010/main" val="4270080904"/>
       </p:ext>
     </p:extLst>
   </p:cSld>

</xml_diff>

<commit_message>
Fixed the issue with the switching views. Added a main menu view with some fancy buttons.
</commit_message>
<xml_diff>
--- a/Documents/Presentations/Milestone 1 presentation.pptx
+++ b/Documents/Presentations/Milestone 1 presentation.pptx
@@ -11,13 +11,15 @@
     <p:sldId id="267" r:id="rId5"/>
     <p:sldId id="268" r:id="rId6"/>
     <p:sldId id="272" r:id="rId7"/>
-    <p:sldId id="269" r:id="rId8"/>
-    <p:sldId id="270" r:id="rId9"/>
-    <p:sldId id="271" r:id="rId10"/>
-    <p:sldId id="260" r:id="rId11"/>
-    <p:sldId id="262" r:id="rId12"/>
-    <p:sldId id="264" r:id="rId13"/>
-    <p:sldId id="265" r:id="rId14"/>
+    <p:sldId id="273" r:id="rId8"/>
+    <p:sldId id="274" r:id="rId9"/>
+    <p:sldId id="269" r:id="rId10"/>
+    <p:sldId id="270" r:id="rId11"/>
+    <p:sldId id="271" r:id="rId12"/>
+    <p:sldId id="260" r:id="rId13"/>
+    <p:sldId id="262" r:id="rId14"/>
+    <p:sldId id="264" r:id="rId15"/>
+    <p:sldId id="265" r:id="rId16"/>
   </p:sldIdLst>
   <p:sldSz cx="12192000" cy="6858000"/>
   <p:notesSz cx="6858000" cy="9144000"/>
@@ -3282,36 +3284,19 @@
         </p:nvSpPr>
         <p:spPr/>
         <p:txBody>
-          <a:bodyPr/>
-          <a:lstStyle/>
-          <a:p>
-            <a:endParaRPr lang="en-US"/>
-          </a:p>
-        </p:txBody>
-      </p:sp>
-      <p:pic>
-        <p:nvPicPr>
-          <p:cNvPr id="4" name="Content Placeholder 3" descr="gegreenmachine.jpg"/>
-          <p:cNvPicPr>
-            <a:picLocks noGrp="1" noChangeAspect="1"/>
-          </p:cNvPicPr>
-          <p:nvPr>
-            <p:ph idx="1"/>
-          </p:nvPr>
-        </p:nvPicPr>
-        <p:blipFill>
-          <a:blip r:embed="rId2" cstate="print"/>
-          <a:stretch>
-            <a:fillRect/>
-          </a:stretch>
-        </p:blipFill>
-        <p:spPr>
-          <a:xfrm>
-            <a:off x="0" y="1416"/>
-            <a:ext cx="12192000" cy="6856584"/>
-          </a:xfrm>
-        </p:spPr>
-      </p:pic>
+          <a:bodyPr>
+            <a:normAutofit fontScale="90000"/>
+          </a:bodyPr>
+          <a:lstStyle/>
+          <a:p>
+            <a:r>
+              <a:rPr lang="en-US" u="sng" dirty="0" smtClean="0"/>
+              <a:t>Evaluate Selected Tools with Small Examples to Analyze Integration/Cohesiveness of Tools:</a:t>
+            </a:r>
+            <a:endParaRPr lang="en-US" dirty="0"/>
+          </a:p>
+        </p:txBody>
+      </p:sp>
       <p:sp>
         <p:nvSpPr>
           <p:cNvPr id="5" name="TextBox 4"/>
@@ -3320,8 +3305,8 @@
         </p:nvSpPr>
         <p:spPr>
           <a:xfrm>
-            <a:off x="6791233" y="190137"/>
-            <a:ext cx="4871847" cy="923330"/>
+            <a:off x="595085" y="1785258"/>
+            <a:ext cx="10892413" cy="2215991"/>
           </a:xfrm>
           <a:prstGeom prst="rect">
             <a:avLst/>
@@ -3329,31 +3314,33 @@
           <a:noFill/>
         </p:spPr>
         <p:txBody>
-          <a:bodyPr wrap="none" rtlCol="0">
+          <a:bodyPr wrap="square" rtlCol="0">
             <a:spAutoFit/>
           </a:bodyPr>
           <a:lstStyle/>
           <a:p>
             <a:r>
-              <a:rPr lang="en-US" sz="5400" smtClean="0">
-                <a:solidFill>
-                  <a:schemeClr val="bg1"/>
-                </a:solidFill>
-              </a:rPr>
-              <a:t>Next Milestone</a:t>
-            </a:r>
-            <a:endParaRPr lang="en-US" sz="5400" dirty="0">
-              <a:solidFill>
-                <a:schemeClr val="bg1"/>
-              </a:solidFill>
-            </a:endParaRPr>
+              <a:rPr lang="en-US" sz="2400" dirty="0" smtClean="0"/>
+              <a:t>As far as small examples and code snippets, we currently have working C# code that implements some of the basic classes that GE requires. We have a basic GUI created using Windows Forms with File and Display functionality. We also have a basic code sample in C# that will establish a database connection with a </a:t>
+            </a:r>
+            <a:r>
+              <a:rPr lang="en-US" sz="2400" dirty="0" err="1" smtClean="0"/>
+              <a:t>MySQL</a:t>
+            </a:r>
+            <a:r>
+              <a:rPr lang="en-US" sz="2400" dirty="0" smtClean="0"/>
+              <a:t> database and allow a user to enter queries. </a:t>
+            </a:r>
+          </a:p>
+          <a:p>
+            <a:endParaRPr lang="en-US" dirty="0"/>
           </a:p>
         </p:txBody>
       </p:sp>
     </p:spTree>
     <p:extLst>
       <p:ext uri="{BB962C8B-B14F-4D97-AF65-F5344CB8AC3E}">
-        <p14:creationId xmlns:p14="http://schemas.microsoft.com/office/powerpoint/2010/main" val="1202250340"/>
+        <p14:creationId xmlns:p14="http://schemas.microsoft.com/office/powerpoint/2010/main" val="4270080904"/>
       </p:ext>
     </p:extLst>
   </p:cSld>
@@ -3392,6 +3379,203 @@
         </p:nvSpPr>
         <p:spPr/>
         <p:txBody>
+          <a:bodyPr>
+            <a:normAutofit fontScale="90000"/>
+          </a:bodyPr>
+          <a:lstStyle/>
+          <a:p>
+            <a:r>
+              <a:rPr lang="en-US" u="sng" dirty="0" smtClean="0"/>
+              <a:t>Begin Drafting Design of Program and GUI</a:t>
+            </a:r>
+            <a:endParaRPr lang="en-US" dirty="0"/>
+          </a:p>
+        </p:txBody>
+      </p:sp>
+      <p:sp>
+        <p:nvSpPr>
+          <p:cNvPr id="5" name="TextBox 4"/>
+          <p:cNvSpPr txBox="1"/>
+          <p:nvPr/>
+        </p:nvSpPr>
+        <p:spPr>
+          <a:xfrm>
+            <a:off x="595085" y="1785258"/>
+            <a:ext cx="10892413" cy="1477328"/>
+          </a:xfrm>
+          <a:prstGeom prst="rect">
+            <a:avLst/>
+          </a:prstGeom>
+          <a:noFill/>
+        </p:spPr>
+        <p:txBody>
+          <a:bodyPr wrap="square" rtlCol="0">
+            <a:spAutoFit/>
+          </a:bodyPr>
+          <a:lstStyle/>
+          <a:p>
+            <a:r>
+              <a:rPr lang="en-US" sz="2400" dirty="0" smtClean="0"/>
+              <a:t>With the help of GE professionals, we completed the SDP at the conclusion of our most recent meeting held on 2/14. We also put the finishing touches on both the GUI plan document, created in Photoshop, and the actual coded GUI.  </a:t>
+            </a:r>
+          </a:p>
+          <a:p>
+            <a:endParaRPr lang="en-US" dirty="0"/>
+          </a:p>
+        </p:txBody>
+      </p:sp>
+    </p:spTree>
+    <p:extLst>
+      <p:ext uri="{BB962C8B-B14F-4D97-AF65-F5344CB8AC3E}">
+        <p14:creationId xmlns:p14="http://schemas.microsoft.com/office/powerpoint/2010/main" val="4270080904"/>
+      </p:ext>
+    </p:extLst>
+  </p:cSld>
+  <p:clrMapOvr>
+    <a:masterClrMapping/>
+  </p:clrMapOvr>
+</p:sld>
+</file>
+
+<file path=ppt/slides/slide12.xml><?xml version="1.0" encoding="utf-8"?>
+<p:sld xmlns:a="http://schemas.openxmlformats.org/drawingml/2006/main" xmlns:r="http://schemas.openxmlformats.org/officeDocument/2006/relationships" xmlns:p="http://schemas.openxmlformats.org/presentationml/2006/main">
+  <p:cSld>
+    <p:spTree>
+      <p:nvGrpSpPr>
+        <p:cNvPr id="1" name=""/>
+        <p:cNvGrpSpPr/>
+        <p:nvPr/>
+      </p:nvGrpSpPr>
+      <p:grpSpPr>
+        <a:xfrm>
+          <a:off x="0" y="0"/>
+          <a:ext cx="0" cy="0"/>
+          <a:chOff x="0" y="0"/>
+          <a:chExt cx="0" cy="0"/>
+        </a:xfrm>
+      </p:grpSpPr>
+      <p:sp>
+        <p:nvSpPr>
+          <p:cNvPr id="2" name="Title 1"/>
+          <p:cNvSpPr>
+            <a:spLocks noGrp="1"/>
+          </p:cNvSpPr>
+          <p:nvPr>
+            <p:ph type="title"/>
+          </p:nvPr>
+        </p:nvSpPr>
+        <p:spPr/>
+        <p:txBody>
+          <a:bodyPr/>
+          <a:lstStyle/>
+          <a:p>
+            <a:endParaRPr lang="en-US"/>
+          </a:p>
+        </p:txBody>
+      </p:sp>
+      <p:pic>
+        <p:nvPicPr>
+          <p:cNvPr id="4" name="Content Placeholder 3" descr="gegreenmachine.jpg"/>
+          <p:cNvPicPr>
+            <a:picLocks noGrp="1" noChangeAspect="1"/>
+          </p:cNvPicPr>
+          <p:nvPr>
+            <p:ph idx="1"/>
+          </p:nvPr>
+        </p:nvPicPr>
+        <p:blipFill>
+          <a:blip r:embed="rId2" cstate="print"/>
+          <a:stretch>
+            <a:fillRect/>
+          </a:stretch>
+        </p:blipFill>
+        <p:spPr>
+          <a:xfrm>
+            <a:off x="0" y="1416"/>
+            <a:ext cx="12192000" cy="6856584"/>
+          </a:xfrm>
+        </p:spPr>
+      </p:pic>
+      <p:sp>
+        <p:nvSpPr>
+          <p:cNvPr id="5" name="TextBox 4"/>
+          <p:cNvSpPr txBox="1"/>
+          <p:nvPr/>
+        </p:nvSpPr>
+        <p:spPr>
+          <a:xfrm>
+            <a:off x="6791233" y="190137"/>
+            <a:ext cx="4871847" cy="923330"/>
+          </a:xfrm>
+          <a:prstGeom prst="rect">
+            <a:avLst/>
+          </a:prstGeom>
+          <a:noFill/>
+        </p:spPr>
+        <p:txBody>
+          <a:bodyPr wrap="none" rtlCol="0">
+            <a:spAutoFit/>
+          </a:bodyPr>
+          <a:lstStyle/>
+          <a:p>
+            <a:r>
+              <a:rPr lang="en-US" sz="5400" smtClean="0">
+                <a:solidFill>
+                  <a:schemeClr val="bg1"/>
+                </a:solidFill>
+              </a:rPr>
+              <a:t>Next Milestone</a:t>
+            </a:r>
+            <a:endParaRPr lang="en-US" sz="5400" dirty="0">
+              <a:solidFill>
+                <a:schemeClr val="bg1"/>
+              </a:solidFill>
+            </a:endParaRPr>
+          </a:p>
+        </p:txBody>
+      </p:sp>
+    </p:spTree>
+    <p:extLst>
+      <p:ext uri="{BB962C8B-B14F-4D97-AF65-F5344CB8AC3E}">
+        <p14:creationId xmlns:p14="http://schemas.microsoft.com/office/powerpoint/2010/main" val="1202250340"/>
+      </p:ext>
+    </p:extLst>
+  </p:cSld>
+  <p:clrMapOvr>
+    <a:masterClrMapping/>
+  </p:clrMapOvr>
+</p:sld>
+</file>
+
+<file path=ppt/slides/slide13.xml><?xml version="1.0" encoding="utf-8"?>
+<p:sld xmlns:a="http://schemas.openxmlformats.org/drawingml/2006/main" xmlns:r="http://schemas.openxmlformats.org/officeDocument/2006/relationships" xmlns:p="http://schemas.openxmlformats.org/presentationml/2006/main">
+  <p:cSld>
+    <p:spTree>
+      <p:nvGrpSpPr>
+        <p:cNvPr id="1" name=""/>
+        <p:cNvGrpSpPr/>
+        <p:nvPr/>
+      </p:nvGrpSpPr>
+      <p:grpSpPr>
+        <a:xfrm>
+          <a:off x="0" y="0"/>
+          <a:ext cx="0" cy="0"/>
+          <a:chOff x="0" y="0"/>
+          <a:chExt cx="0" cy="0"/>
+        </a:xfrm>
+      </p:grpSpPr>
+      <p:sp>
+        <p:nvSpPr>
+          <p:cNvPr id="2" name="Title 1"/>
+          <p:cNvSpPr>
+            <a:spLocks noGrp="1"/>
+          </p:cNvSpPr>
+          <p:nvPr>
+            <p:ph type="title"/>
+          </p:nvPr>
+        </p:nvSpPr>
+        <p:spPr/>
+        <p:txBody>
           <a:bodyPr/>
           <a:lstStyle/>
           <a:p>
@@ -3456,7 +3640,7 @@
 </p:sld>
 </file>
 
-<file path=ppt/slides/slide12.xml><?xml version="1.0" encoding="utf-8"?>
+<file path=ppt/slides/slide14.xml><?xml version="1.0" encoding="utf-8"?>
 <p:sld xmlns:a="http://schemas.openxmlformats.org/drawingml/2006/main" xmlns:r="http://schemas.openxmlformats.org/officeDocument/2006/relationships" xmlns:p="http://schemas.openxmlformats.org/presentationml/2006/main">
   <p:cSld>
     <p:spTree>
@@ -3994,7 +4178,7 @@
 </p:sld>
 </file>
 
-<file path=ppt/slides/slide13.xml><?xml version="1.0" encoding="utf-8"?>
+<file path=ppt/slides/slide15.xml><?xml version="1.0" encoding="utf-8"?>
 <p:sld xmlns:a="http://schemas.openxmlformats.org/drawingml/2006/main" xmlns:r="http://schemas.openxmlformats.org/officeDocument/2006/relationships" xmlns:p="http://schemas.openxmlformats.org/presentationml/2006/main">
   <p:cSld>
     <p:spTree>
@@ -5830,11 +6014,7 @@
           <a:p>
             <a:r>
               <a:rPr lang="en-US" sz="2800" dirty="0" smtClean="0"/>
-              <a:t> formalized list of requirements for the project. The document includes five requirements</a:t>
-            </a:r>
-            <a:r>
-              <a:rPr lang="en-US" sz="2800" dirty="0" smtClean="0"/>
-              <a:t>.</a:t>
+              <a:t> formalized list of requirements for the project. The document includes five requirements.</a:t>
             </a:r>
           </a:p>
           <a:p>
@@ -5915,35 +6095,79 @@
           <a:p>
             <a:r>
               <a:rPr lang="en-US" dirty="0" smtClean="0"/>
-              <a:t>1. Safe breaking Distance</a:t>
-            </a:r>
-          </a:p>
-          <a:p>
+              <a:t>I. Include formulas to calculate </a:t>
+            </a:r>
+          </a:p>
+          <a:p>
+            <a:pPr lvl="1"/>
             <a:r>
               <a:rPr lang="en-US" dirty="0" smtClean="0"/>
-              <a:t>2. Headway Calculations</a:t>
-            </a:r>
-          </a:p>
-          <a:p>
+              <a:t>1</a:t>
+            </a:r>
+            <a:r>
+              <a:rPr lang="en-US" dirty="0" smtClean="0"/>
+              <a:t>. Safe breaking Distance</a:t>
+            </a:r>
+          </a:p>
+          <a:p>
+            <a:pPr lvl="1"/>
+            <a:r>
+              <a:rPr lang="en-US" dirty="0" smtClean="0"/>
+              <a:t>2. </a:t>
+            </a:r>
+            <a:r>
+              <a:rPr lang="en-US" dirty="0" smtClean="0"/>
+              <a:t>Headway Calculations</a:t>
+            </a:r>
+          </a:p>
+          <a:p>
+            <a:pPr lvl="1"/>
             <a:r>
               <a:rPr lang="en-US" dirty="0" smtClean="0"/>
               <a:t>3. Runtime Performance Calculations</a:t>
             </a:r>
           </a:p>
           <a:p>
+            <a:pPr lvl="1"/>
             <a:r>
               <a:rPr lang="en-US" dirty="0" smtClean="0"/>
-              <a:t>4. Clear Time Calculations</a:t>
-            </a:r>
-          </a:p>
-          <a:p>
+              <a:t>4. Clear Time </a:t>
+            </a:r>
             <a:r>
               <a:rPr lang="en-US" dirty="0" smtClean="0"/>
-              <a:t>5. Approach Locking Time Calculations</a:t>
-            </a:r>
-          </a:p>
-          <a:p>
+              <a:t>Calculations	</a:t>
+            </a:r>
             <a:endParaRPr lang="en-US" dirty="0" smtClean="0"/>
+          </a:p>
+          <a:p>
+            <a:pPr lvl="1"/>
+            <a:r>
+              <a:rPr lang="en-US" dirty="0" smtClean="0"/>
+              <a:t>5. Approach Locking Time </a:t>
+            </a:r>
+            <a:r>
+              <a:rPr lang="en-US" dirty="0" smtClean="0"/>
+              <a:t>Calculations</a:t>
+            </a:r>
+            <a:endParaRPr lang="en-US" dirty="0" smtClean="0"/>
+          </a:p>
+          <a:p>
+            <a:r>
+              <a:rPr lang="en-US" dirty="0" smtClean="0"/>
+              <a:t>II. Ability to connect to Database</a:t>
+            </a:r>
+          </a:p>
+          <a:p>
+            <a:r>
+              <a:rPr lang="en-US" dirty="0" smtClean="0"/>
+              <a:t>III. Perform analysis on data provided</a:t>
+            </a:r>
+          </a:p>
+          <a:p>
+            <a:pPr marL="137160" indent="0">
+              <a:buNone/>
+            </a:pPr>
+            <a:endParaRPr lang="en-US" dirty="0"/>
           </a:p>
         </p:txBody>
       </p:sp>
@@ -5989,14 +6213,12 @@
         </p:nvSpPr>
         <p:spPr/>
         <p:txBody>
-          <a:bodyPr>
-            <a:normAutofit fontScale="90000"/>
-          </a:bodyPr>
-          <a:lstStyle/>
-          <a:p>
-            <a:r>
-              <a:rPr lang="en-US" u="sng" dirty="0" smtClean="0"/>
-              <a:t>Decide on IDE/Programming Language/Database Tools</a:t>
+          <a:bodyPr/>
+          <a:lstStyle/>
+          <a:p>
+            <a:r>
+              <a:rPr lang="en-US" dirty="0" smtClean="0"/>
+              <a:t>Requirements</a:t>
             </a:r>
             <a:endParaRPr lang="en-US" dirty="0"/>
           </a:p>
@@ -6004,84 +6226,57 @@
       </p:sp>
       <p:sp>
         <p:nvSpPr>
-          <p:cNvPr id="5" name="TextBox 4"/>
-          <p:cNvSpPr txBox="1"/>
-          <p:nvPr/>
-        </p:nvSpPr>
-        <p:spPr>
-          <a:xfrm>
-            <a:off x="595085" y="1785258"/>
-            <a:ext cx="10892413" cy="4062651"/>
-          </a:xfrm>
-          <a:prstGeom prst="rect">
-            <a:avLst/>
-          </a:prstGeom>
-          <a:noFill/>
-        </p:spPr>
-        <p:txBody>
-          <a:bodyPr wrap="square" rtlCol="0">
-            <a:spAutoFit/>
-          </a:bodyPr>
-          <a:lstStyle/>
-          <a:p>
-            <a:r>
-              <a:rPr lang="en-US" sz="2400" dirty="0" smtClean="0"/>
-              <a:t>At the beginning of our third meeting with Dan </a:t>
-            </a:r>
-            <a:r>
-              <a:rPr lang="en-US" sz="2400" dirty="0" err="1" smtClean="0"/>
-              <a:t>Ballesty</a:t>
-            </a:r>
-            <a:r>
-              <a:rPr lang="en-US" sz="2400" dirty="0" smtClean="0"/>
-              <a:t>, we reviewed the requirements document and held an open conversation as to which tools/IDE/programming language/database software would provide the greatest amount of ease throughout the project. The decisions that we made were:</a:t>
-            </a:r>
-          </a:p>
-          <a:p>
-            <a:endParaRPr lang="en-US" sz="2400" dirty="0" smtClean="0"/>
-          </a:p>
-          <a:p>
-            <a:pPr lvl="0"/>
-            <a:r>
-              <a:rPr lang="en-US" sz="2400" dirty="0" smtClean="0"/>
-              <a:t>IDE:  Visual Studio</a:t>
-            </a:r>
-          </a:p>
-          <a:p>
-            <a:pPr lvl="0"/>
-            <a:r>
-              <a:rPr lang="en-US" sz="2400" dirty="0" smtClean="0"/>
-              <a:t>Programming Language: C#/.NET</a:t>
-            </a:r>
-          </a:p>
-          <a:p>
-            <a:pPr lvl="0"/>
-            <a:r>
-              <a:rPr lang="en-US" sz="2400" dirty="0" smtClean="0"/>
-              <a:t>Tools: Windows Forms (For GUI), Photoshop for GUI design</a:t>
-            </a:r>
-          </a:p>
-          <a:p>
-            <a:pPr lvl="0"/>
-            <a:r>
-              <a:rPr lang="en-US" sz="2400" dirty="0" smtClean="0"/>
-              <a:t>Database Tools: </a:t>
-            </a:r>
-            <a:r>
-              <a:rPr lang="en-US" sz="2400" dirty="0" err="1" smtClean="0"/>
-              <a:t>MySQL</a:t>
-            </a:r>
-            <a:endParaRPr lang="en-US" sz="2400" dirty="0" smtClean="0"/>
-          </a:p>
-          <a:p>
-            <a:endParaRPr lang="en-US" dirty="0"/>
+          <p:cNvPr id="3" name="Content Placeholder 2"/>
+          <p:cNvSpPr>
+            <a:spLocks noGrp="1"/>
+          </p:cNvSpPr>
+          <p:nvPr>
+            <p:ph idx="1"/>
+          </p:nvPr>
+        </p:nvSpPr>
+        <p:spPr/>
+        <p:txBody>
+          <a:bodyPr/>
+          <a:lstStyle/>
+          <a:p>
+            <a:r>
+              <a:rPr lang="en-US" dirty="0" smtClean="0"/>
+              <a:t>IV. Be able to display</a:t>
+            </a:r>
+          </a:p>
+          <a:p>
+            <a:pPr lvl="1"/>
+            <a:r>
+              <a:rPr lang="en-US" dirty="0" smtClean="0"/>
+              <a:t>1. Excel formatted spreadsheets</a:t>
+            </a:r>
+          </a:p>
+          <a:p>
+            <a:pPr lvl="1"/>
+            <a:r>
+              <a:rPr lang="en-US" dirty="0" smtClean="0"/>
+              <a:t>2. Track and Train Graphs</a:t>
+            </a:r>
+          </a:p>
+          <a:p>
+            <a:pPr lvl="1"/>
+            <a:r>
+              <a:rPr lang="en-US" dirty="0" smtClean="0"/>
+              <a:t>3. Train simulations</a:t>
+            </a:r>
+          </a:p>
+          <a:p>
+            <a:r>
+              <a:rPr lang="en-US" dirty="0" smtClean="0"/>
+              <a:t>V. Output to specific file types</a:t>
+            </a:r>
           </a:p>
         </p:txBody>
       </p:sp>
     </p:spTree>
     <p:extLst>
       <p:ext uri="{BB962C8B-B14F-4D97-AF65-F5344CB8AC3E}">
-        <p14:creationId xmlns:p14="http://schemas.microsoft.com/office/powerpoint/2010/main" val="4270080904"/>
+        <p14:creationId xmlns:p14="http://schemas.microsoft.com/office/powerpoint/2010/main" val="2891250505"/>
       </p:ext>
     </p:extLst>
   </p:cSld>
@@ -6121,13 +6316,13 @@
         <p:spPr/>
         <p:txBody>
           <a:bodyPr>
-            <a:normAutofit fontScale="90000"/>
+            <a:normAutofit/>
           </a:bodyPr>
           <a:lstStyle/>
           <a:p>
             <a:r>
-              <a:rPr lang="en-US" u="sng" dirty="0" smtClean="0"/>
-              <a:t>Evaluate Selected Tools with Small Examples to Analyze Integration/Cohesiveness of Tools:</a:t>
+              <a:rPr lang="en-US" dirty="0" smtClean="0"/>
+              <a:t>Test Plan</a:t>
             </a:r>
             <a:endParaRPr lang="en-US" dirty="0"/>
           </a:p>
@@ -6135,40 +6330,47 @@
       </p:sp>
       <p:sp>
         <p:nvSpPr>
-          <p:cNvPr id="5" name="TextBox 4"/>
-          <p:cNvSpPr txBox="1"/>
-          <p:nvPr/>
-        </p:nvSpPr>
-        <p:spPr>
-          <a:xfrm>
-            <a:off x="595085" y="1785258"/>
-            <a:ext cx="10892413" cy="2215991"/>
-          </a:xfrm>
-          <a:prstGeom prst="rect">
-            <a:avLst/>
-          </a:prstGeom>
-          <a:noFill/>
-        </p:spPr>
-        <p:txBody>
-          <a:bodyPr wrap="square" rtlCol="0">
-            <a:spAutoFit/>
-          </a:bodyPr>
-          <a:lstStyle/>
-          <a:p>
-            <a:r>
-              <a:rPr lang="en-US" sz="2400" dirty="0" smtClean="0"/>
-              <a:t>As far as small examples and code snippets, we currently have working C# code that implements some of the basic classes that GE requires. We have a basic GUI created using Windows Forms with File and Display functionality. We also have a basic code sample in C# that will establish a database connection with a </a:t>
-            </a:r>
-            <a:r>
-              <a:rPr lang="en-US" sz="2400" dirty="0" err="1" smtClean="0"/>
-              <a:t>MySQL</a:t>
-            </a:r>
-            <a:r>
-              <a:rPr lang="en-US" sz="2400" dirty="0" smtClean="0"/>
-              <a:t> database and allow a user to enter queries. </a:t>
-            </a:r>
-          </a:p>
-          <a:p>
+          <p:cNvPr id="3" name="Content Placeholder 2"/>
+          <p:cNvSpPr>
+            <a:spLocks noGrp="1"/>
+          </p:cNvSpPr>
+          <p:nvPr>
+            <p:ph idx="1"/>
+          </p:nvPr>
+        </p:nvSpPr>
+        <p:spPr/>
+        <p:txBody>
+          <a:bodyPr/>
+          <a:lstStyle/>
+          <a:p>
+            <a:r>
+              <a:rPr lang="en-US" dirty="0" smtClean="0"/>
+              <a:t>Compare calculations from our formulas to the ones given to us by GE.</a:t>
+            </a:r>
+          </a:p>
+          <a:p>
+            <a:r>
+              <a:rPr lang="en-US" dirty="0" smtClean="0"/>
+              <a:t>Ensure functionality of current GUI layout(</a:t>
+            </a:r>
+            <a:r>
+              <a:rPr lang="en-US" dirty="0" err="1" smtClean="0"/>
+              <a:t>ie</a:t>
+            </a:r>
+            <a:r>
+              <a:rPr lang="en-US" dirty="0" smtClean="0"/>
+              <a:t> Ensure you can perform a feature tour and the GUI will not crash)</a:t>
+            </a:r>
+          </a:p>
+          <a:p>
+            <a:r>
+              <a:rPr lang="en-US" dirty="0" smtClean="0"/>
+              <a:t>Ensure data can be successfully entered and then retrieved from our database and that the data entered and retrieved </a:t>
+            </a:r>
+            <a:r>
+              <a:rPr lang="en-US" smtClean="0"/>
+              <a:t>is correct</a:t>
+            </a:r>
             <a:endParaRPr lang="en-US" dirty="0"/>
           </a:p>
         </p:txBody>
@@ -6176,7 +6378,7 @@
     </p:spTree>
     <p:extLst>
       <p:ext uri="{BB962C8B-B14F-4D97-AF65-F5344CB8AC3E}">
-        <p14:creationId xmlns:p14="http://schemas.microsoft.com/office/powerpoint/2010/main" val="4270080904"/>
+        <p14:creationId xmlns:p14="http://schemas.microsoft.com/office/powerpoint/2010/main" val="3042954688"/>
       </p:ext>
     </p:extLst>
   </p:cSld>
@@ -6222,7 +6424,7 @@
           <a:p>
             <a:r>
               <a:rPr lang="en-US" u="sng" dirty="0" smtClean="0"/>
-              <a:t>Begin Drafting Design of Program and GUI</a:t>
+              <a:t>Decide on IDE/Programming Language/Database Tools</a:t>
             </a:r>
             <a:endParaRPr lang="en-US" dirty="0"/>
           </a:p>
@@ -6237,7 +6439,7 @@
         <p:spPr>
           <a:xfrm>
             <a:off x="595085" y="1785258"/>
-            <a:ext cx="10892413" cy="1477328"/>
+            <a:ext cx="10892413" cy="4062651"/>
           </a:xfrm>
           <a:prstGeom prst="rect">
             <a:avLst/>
@@ -6252,8 +6454,52 @@
           <a:p>
             <a:r>
               <a:rPr lang="en-US" sz="2400" dirty="0" smtClean="0"/>
-              <a:t>With the help of GE professionals, we completed the SDP at the conclusion of our most recent meeting held on 2/14. We also put the finishing touches on both the GUI plan document, created in Photoshop, and the actual coded GUI.  </a:t>
-            </a:r>
+              <a:t>At the beginning of our third meeting with Dan </a:t>
+            </a:r>
+            <a:r>
+              <a:rPr lang="en-US" sz="2400" dirty="0" err="1" smtClean="0"/>
+              <a:t>Ballesty</a:t>
+            </a:r>
+            <a:r>
+              <a:rPr lang="en-US" sz="2400" dirty="0" smtClean="0"/>
+              <a:t>, we reviewed the requirements document and held an open conversation as to which tools/IDE/programming language/database software would provide the greatest amount of ease throughout the project. The decisions that we made were:</a:t>
+            </a:r>
+          </a:p>
+          <a:p>
+            <a:endParaRPr lang="en-US" sz="2400" dirty="0" smtClean="0"/>
+          </a:p>
+          <a:p>
+            <a:pPr lvl="0"/>
+            <a:r>
+              <a:rPr lang="en-US" sz="2400" dirty="0" smtClean="0"/>
+              <a:t>IDE:  Visual Studio</a:t>
+            </a:r>
+          </a:p>
+          <a:p>
+            <a:pPr lvl="0"/>
+            <a:r>
+              <a:rPr lang="en-US" sz="2400" dirty="0" smtClean="0"/>
+              <a:t>Programming Language: C#/.NET</a:t>
+            </a:r>
+          </a:p>
+          <a:p>
+            <a:pPr lvl="0"/>
+            <a:r>
+              <a:rPr lang="en-US" sz="2400" dirty="0" smtClean="0"/>
+              <a:t>Tools: Windows Forms (For GUI), Photoshop for GUI design</a:t>
+            </a:r>
+          </a:p>
+          <a:p>
+            <a:pPr lvl="0"/>
+            <a:r>
+              <a:rPr lang="en-US" sz="2400" dirty="0" smtClean="0"/>
+              <a:t>Database Tools: </a:t>
+            </a:r>
+            <a:r>
+              <a:rPr lang="en-US" sz="2400" dirty="0" err="1" smtClean="0"/>
+              <a:t>MySQL</a:t>
+            </a:r>
+            <a:endParaRPr lang="en-US" sz="2400" dirty="0" smtClean="0"/>
           </a:p>
           <a:p>
             <a:endParaRPr lang="en-US" dirty="0"/>

</xml_diff>